<commit_message>
Finished equality slides and fixed minor typos
</commit_message>
<xml_diff>
--- a/01_Equality/Equality.pptx
+++ b/01_Equality/Equality.pptx
@@ -5,7 +5,7 @@
     <p:sldMasterId id="2147483648" r:id="rId1"/>
   </p:sldMasterIdLst>
   <p:notesMasterIdLst>
-    <p:notesMasterId r:id="rId16"/>
+    <p:notesMasterId r:id="rId27"/>
   </p:notesMasterIdLst>
   <p:sldIdLst>
     <p:sldId id="258" r:id="rId2"/>
@@ -18,10 +18,21 @@
     <p:sldId id="269" r:id="rId9"/>
     <p:sldId id="270" r:id="rId10"/>
     <p:sldId id="271" r:id="rId11"/>
-    <p:sldId id="263" r:id="rId12"/>
-    <p:sldId id="264" r:id="rId13"/>
-    <p:sldId id="265" r:id="rId14"/>
-    <p:sldId id="261" r:id="rId15"/>
+    <p:sldId id="273" r:id="rId12"/>
+    <p:sldId id="272" r:id="rId13"/>
+    <p:sldId id="264" r:id="rId14"/>
+    <p:sldId id="274" r:id="rId15"/>
+    <p:sldId id="275" r:id="rId16"/>
+    <p:sldId id="276" r:id="rId17"/>
+    <p:sldId id="277" r:id="rId18"/>
+    <p:sldId id="278" r:id="rId19"/>
+    <p:sldId id="279" r:id="rId20"/>
+    <p:sldId id="280" r:id="rId21"/>
+    <p:sldId id="265" r:id="rId22"/>
+    <p:sldId id="281" r:id="rId23"/>
+    <p:sldId id="282" r:id="rId24"/>
+    <p:sldId id="283" r:id="rId25"/>
+    <p:sldId id="261" r:id="rId26"/>
   </p:sldIdLst>
   <p:sldSz cx="12192000" cy="6858000"/>
   <p:notesSz cx="6858000" cy="9144000"/>
@@ -710,7 +721,7 @@
           <a:p>
             <a:fld id="{E0746DE6-3336-457D-A091-FA20AC1C536E}" type="slidenum">
               <a:rPr lang="en-US" smtClean="0"/>
-              <a:t>11</a:t>
+              <a:t>13</a:t>
             </a:fld>
             <a:endParaRPr lang="en-US"/>
           </a:p>
@@ -719,7 +730,7 @@
     </p:spTree>
     <p:extLst>
       <p:ext uri="{BB962C8B-B14F-4D97-AF65-F5344CB8AC3E}">
-        <p14:creationId xmlns:p14="http://schemas.microsoft.com/office/powerpoint/2010/main" val="389376094"/>
+        <p14:creationId xmlns:p14="http://schemas.microsoft.com/office/powerpoint/2010/main" val="3969646583"/>
       </p:ext>
     </p:extLst>
   </p:cSld>
@@ -794,91 +805,7 @@
           <a:p>
             <a:fld id="{E0746DE6-3336-457D-A091-FA20AC1C536E}" type="slidenum">
               <a:rPr lang="en-US" smtClean="0"/>
-              <a:t>12</a:t>
-            </a:fld>
-            <a:endParaRPr lang="en-US"/>
-          </a:p>
-        </p:txBody>
-      </p:sp>
-    </p:spTree>
-    <p:extLst>
-      <p:ext uri="{BB962C8B-B14F-4D97-AF65-F5344CB8AC3E}">
-        <p14:creationId xmlns:p14="http://schemas.microsoft.com/office/powerpoint/2010/main" val="3969646583"/>
-      </p:ext>
-    </p:extLst>
-  </p:cSld>
-  <p:clrMapOvr>
-    <a:masterClrMapping/>
-  </p:clrMapOvr>
-</p:notes>
-</file>
-
-<file path=ppt/notesSlides/notesSlide5.xml><?xml version="1.0" encoding="utf-8"?>
-<p:notes xmlns:a="http://schemas.openxmlformats.org/drawingml/2006/main" xmlns:r="http://schemas.openxmlformats.org/officeDocument/2006/relationships" xmlns:p="http://schemas.openxmlformats.org/presentationml/2006/main">
-  <p:cSld>
-    <p:spTree>
-      <p:nvGrpSpPr>
-        <p:cNvPr id="1" name=""/>
-        <p:cNvGrpSpPr/>
-        <p:nvPr/>
-      </p:nvGrpSpPr>
-      <p:grpSpPr>
-        <a:xfrm>
-          <a:off x="0" y="0"/>
-          <a:ext cx="0" cy="0"/>
-          <a:chOff x="0" y="0"/>
-          <a:chExt cx="0" cy="0"/>
-        </a:xfrm>
-      </p:grpSpPr>
-      <p:sp>
-        <p:nvSpPr>
-          <p:cNvPr id="2" name="Slide Image Placeholder 1"/>
-          <p:cNvSpPr>
-            <a:spLocks noGrp="1" noRot="1" noChangeAspect="1"/>
-          </p:cNvSpPr>
-          <p:nvPr>
-            <p:ph type="sldImg"/>
-          </p:nvPr>
-        </p:nvSpPr>
-        <p:spPr/>
-      </p:sp>
-      <p:sp>
-        <p:nvSpPr>
-          <p:cNvPr id="3" name="Notes Placeholder 2"/>
-          <p:cNvSpPr>
-            <a:spLocks noGrp="1"/>
-          </p:cNvSpPr>
-          <p:nvPr>
-            <p:ph type="body" idx="1"/>
-          </p:nvPr>
-        </p:nvSpPr>
-        <p:spPr/>
-        <p:txBody>
-          <a:bodyPr/>
-          <a:lstStyle/>
-          <a:p>
-            <a:endParaRPr lang="en-US" dirty="0"/>
-          </a:p>
-        </p:txBody>
-      </p:sp>
-      <p:sp>
-        <p:nvSpPr>
-          <p:cNvPr id="4" name="Slide Number Placeholder 3"/>
-          <p:cNvSpPr>
-            <a:spLocks noGrp="1"/>
-          </p:cNvSpPr>
-          <p:nvPr>
-            <p:ph type="sldNum" sz="quarter" idx="10"/>
-          </p:nvPr>
-        </p:nvSpPr>
-        <p:spPr/>
-        <p:txBody>
-          <a:bodyPr/>
-          <a:lstStyle/>
-          <a:p>
-            <a:fld id="{E0746DE6-3336-457D-A091-FA20AC1C536E}" type="slidenum">
-              <a:rPr lang="en-US" smtClean="0"/>
-              <a:t>13</a:t>
+              <a:t>21</a:t>
             </a:fld>
             <a:endParaRPr lang="en-US"/>
           </a:p>
@@ -3998,7 +3925,7 @@
           <a:p>
             <a:r>
               <a:rPr lang="en-US" dirty="0"/>
-              <a:t>Exercises</a:t>
+              <a:t>Type Judgment Exercises</a:t>
             </a:r>
           </a:p>
         </p:txBody>
@@ -4267,6 +4194,410 @@
 <file path=ppt/slides/slide11.xml><?xml version="1.0" encoding="utf-8"?>
 <p:sld xmlns:a="http://schemas.openxmlformats.org/drawingml/2006/main" xmlns:r="http://schemas.openxmlformats.org/officeDocument/2006/relationships" xmlns:p="http://schemas.openxmlformats.org/presentationml/2006/main">
   <p:cSld>
+    <p:spTree>
+      <p:nvGrpSpPr>
+        <p:cNvPr id="1" name=""/>
+        <p:cNvGrpSpPr/>
+        <p:nvPr/>
+      </p:nvGrpSpPr>
+      <p:grpSpPr>
+        <a:xfrm>
+          <a:off x="0" y="0"/>
+          <a:ext cx="0" cy="0"/>
+          <a:chOff x="0" y="0"/>
+          <a:chExt cx="0" cy="0"/>
+        </a:xfrm>
+      </p:grpSpPr>
+      <p:sp>
+        <p:nvSpPr>
+          <p:cNvPr id="2" name="Title 1">
+            <a:extLst>
+              <a:ext uri="{FF2B5EF4-FFF2-40B4-BE49-F238E27FC236}">
+                <a16:creationId xmlns:a16="http://schemas.microsoft.com/office/drawing/2014/main" id="{61A87205-0A87-A54F-BF9B-6C5EFC2C62CD}"/>
+              </a:ext>
+            </a:extLst>
+          </p:cNvPr>
+          <p:cNvSpPr>
+            <a:spLocks noGrp="1"/>
+          </p:cNvSpPr>
+          <p:nvPr>
+            <p:ph type="title"/>
+          </p:nvPr>
+        </p:nvSpPr>
+        <p:spPr/>
+        <p:txBody>
+          <a:bodyPr/>
+          <a:lstStyle/>
+          <a:p>
+            <a:r>
+              <a:rPr lang="en-US" dirty="0"/>
+              <a:t>Checking Lean’s Type Inference</a:t>
+            </a:r>
+          </a:p>
+        </p:txBody>
+      </p:sp>
+      <p:sp>
+        <p:nvSpPr>
+          <p:cNvPr id="3" name="Content Placeholder 2">
+            <a:extLst>
+              <a:ext uri="{FF2B5EF4-FFF2-40B4-BE49-F238E27FC236}">
+                <a16:creationId xmlns:a16="http://schemas.microsoft.com/office/drawing/2014/main" id="{DA4BC9ED-16E4-7840-9A13-1697EE148DB2}"/>
+              </a:ext>
+            </a:extLst>
+          </p:cNvPr>
+          <p:cNvSpPr>
+            <a:spLocks noGrp="1"/>
+          </p:cNvSpPr>
+          <p:nvPr>
+            <p:ph idx="1"/>
+          </p:nvPr>
+        </p:nvSpPr>
+        <p:spPr/>
+        <p:txBody>
+          <a:bodyPr>
+            <a:normAutofit/>
+          </a:bodyPr>
+          <a:lstStyle/>
+          <a:p>
+            <a:r>
+              <a:rPr lang="en-US" sz="3200" dirty="0"/>
+              <a:t>To check what type Lean will infer for a particular value, use </a:t>
+            </a:r>
+            <a:r>
+              <a:rPr lang="en-US" dirty="0">
+                <a:latin typeface="Courier New" panose="02070309020205020404" pitchFamily="49" charset="0"/>
+                <a:cs typeface="Courier New" panose="02070309020205020404" pitchFamily="49" charset="0"/>
+              </a:rPr>
+              <a:t>#check</a:t>
+            </a:r>
+            <a:endParaRPr lang="en-US" sz="3200" dirty="0">
+              <a:latin typeface="Courier New" panose="02070309020205020404" pitchFamily="49" charset="0"/>
+              <a:cs typeface="Courier New" panose="02070309020205020404" pitchFamily="49" charset="0"/>
+            </a:endParaRPr>
+          </a:p>
+          <a:p>
+            <a:pPr lvl="1"/>
+            <a:r>
+              <a:rPr lang="en-US" sz="2800" dirty="0"/>
+              <a:t>See 01_Equality/03_type_inference.lean</a:t>
+            </a:r>
+          </a:p>
+          <a:p>
+            <a:r>
+              <a:rPr lang="en-US" sz="3200" dirty="0"/>
+              <a:t>If we </a:t>
+            </a:r>
+            <a:r>
+              <a:rPr lang="en-US" dirty="0">
+                <a:latin typeface="Courier New" panose="02070309020205020404" pitchFamily="49" charset="0"/>
+                <a:cs typeface="Courier New" panose="02070309020205020404" pitchFamily="49" charset="0"/>
+              </a:rPr>
+              <a:t>#check (</a:t>
+            </a:r>
+            <a:r>
+              <a:rPr lang="en-US" dirty="0" err="1">
+                <a:latin typeface="Courier New" panose="02070309020205020404" pitchFamily="49" charset="0"/>
+                <a:cs typeface="Courier New" panose="02070309020205020404" pitchFamily="49" charset="0"/>
+              </a:rPr>
+              <a:t>eq.refl</a:t>
+            </a:r>
+            <a:r>
+              <a:rPr lang="en-US" dirty="0">
+                <a:latin typeface="Courier New" panose="02070309020205020404" pitchFamily="49" charset="0"/>
+                <a:cs typeface="Courier New" panose="02070309020205020404" pitchFamily="49" charset="0"/>
+              </a:rPr>
+              <a:t> 0)</a:t>
+            </a:r>
+            <a:r>
+              <a:rPr lang="en-US" sz="3200" dirty="0"/>
+              <a:t> we see that its </a:t>
+            </a:r>
+            <a:r>
+              <a:rPr lang="en-US" sz="3200" i="1" dirty="0"/>
+              <a:t>type</a:t>
+            </a:r>
+            <a:r>
+              <a:rPr lang="en-US" sz="3200" dirty="0"/>
+              <a:t> is a proof that </a:t>
+            </a:r>
+            <a:r>
+              <a:rPr lang="en-US" sz="3200" dirty="0">
+                <a:latin typeface="Courier New" panose="02070309020205020404" pitchFamily="49" charset="0"/>
+                <a:cs typeface="Courier New" panose="02070309020205020404" pitchFamily="49" charset="0"/>
+              </a:rPr>
+              <a:t>0 = 0</a:t>
+            </a:r>
+            <a:r>
+              <a:rPr lang="en-US" sz="3200" dirty="0"/>
+              <a:t>!</a:t>
+            </a:r>
+          </a:p>
+          <a:p>
+            <a:pPr lvl="1"/>
+            <a:r>
+              <a:rPr lang="en-US" sz="2800" dirty="0"/>
+              <a:t>What does this mean?</a:t>
+            </a:r>
+          </a:p>
+        </p:txBody>
+      </p:sp>
+    </p:spTree>
+    <p:extLst>
+      <p:ext uri="{BB962C8B-B14F-4D97-AF65-F5344CB8AC3E}">
+        <p14:creationId xmlns:p14="http://schemas.microsoft.com/office/powerpoint/2010/main" val="3755022689"/>
+      </p:ext>
+    </p:extLst>
+  </p:cSld>
+  <p:clrMapOvr>
+    <a:masterClrMapping/>
+  </p:clrMapOvr>
+</p:sld>
+</file>
+
+<file path=ppt/slides/slide12.xml><?xml version="1.0" encoding="utf-8"?>
+<p:sld xmlns:a="http://schemas.openxmlformats.org/drawingml/2006/main" xmlns:r="http://schemas.openxmlformats.org/officeDocument/2006/relationships" xmlns:p="http://schemas.openxmlformats.org/presentationml/2006/main">
+  <p:cSld>
+    <p:spTree>
+      <p:nvGrpSpPr>
+        <p:cNvPr id="1" name=""/>
+        <p:cNvGrpSpPr/>
+        <p:nvPr/>
+      </p:nvGrpSpPr>
+      <p:grpSpPr>
+        <a:xfrm>
+          <a:off x="0" y="0"/>
+          <a:ext cx="0" cy="0"/>
+          <a:chOff x="0" y="0"/>
+          <a:chExt cx="0" cy="0"/>
+        </a:xfrm>
+      </p:grpSpPr>
+      <p:sp>
+        <p:nvSpPr>
+          <p:cNvPr id="2" name="Title 1">
+            <a:extLst>
+              <a:ext uri="{FF2B5EF4-FFF2-40B4-BE49-F238E27FC236}">
+                <a16:creationId xmlns:a16="http://schemas.microsoft.com/office/drawing/2014/main" id="{78E0DDA8-607B-7040-8CEC-0728DE053BCF}"/>
+              </a:ext>
+            </a:extLst>
+          </p:cNvPr>
+          <p:cNvSpPr>
+            <a:spLocks noGrp="1"/>
+          </p:cNvSpPr>
+          <p:nvPr>
+            <p:ph type="title"/>
+          </p:nvPr>
+        </p:nvSpPr>
+        <p:spPr/>
+        <p:txBody>
+          <a:bodyPr/>
+          <a:lstStyle/>
+          <a:p>
+            <a:r>
+              <a:rPr lang="en-US" dirty="0"/>
+              <a:t>Type Inference Exercises</a:t>
+            </a:r>
+          </a:p>
+        </p:txBody>
+      </p:sp>
+      <mc:AlternateContent xmlns:mc="http://schemas.openxmlformats.org/markup-compatibility/2006">
+        <mc:Choice xmlns:a14="http://schemas.microsoft.com/office/drawing/2010/main" Requires="a14">
+          <p:sp>
+            <p:nvSpPr>
+              <p:cNvPr id="3" name="Content Placeholder 2">
+                <a:extLst>
+                  <a:ext uri="{FF2B5EF4-FFF2-40B4-BE49-F238E27FC236}">
+                    <a16:creationId xmlns:a16="http://schemas.microsoft.com/office/drawing/2014/main" id="{CD284038-4C75-5743-9B2C-0656B82E145D}"/>
+                  </a:ext>
+                </a:extLst>
+              </p:cNvPr>
+              <p:cNvSpPr>
+                <a:spLocks noGrp="1"/>
+              </p:cNvSpPr>
+              <p:nvPr>
+                <p:ph idx="1"/>
+              </p:nvPr>
+            </p:nvSpPr>
+            <p:spPr/>
+            <p:txBody>
+              <a:bodyPr/>
+              <a:lstStyle/>
+              <a:p>
+                <a:r>
+                  <a:rPr lang="en-US" dirty="0"/>
+                  <a:t>Use </a:t>
+                </a:r>
+                <a:r>
+                  <a:rPr lang="en-US" sz="2400" dirty="0">
+                    <a:latin typeface="Courier New" panose="02070309020205020404" pitchFamily="49" charset="0"/>
+                    <a:cs typeface="Courier New" panose="02070309020205020404" pitchFamily="49" charset="0"/>
+                  </a:rPr>
+                  <a:t>#check </a:t>
+                </a:r>
+                <a:r>
+                  <a:rPr lang="en-US" dirty="0"/>
+                  <a:t>to see what the type is for </a:t>
+                </a:r>
+                <a:r>
+                  <a:rPr lang="en-US" sz="2400" dirty="0" err="1">
+                    <a:latin typeface="Courier New" panose="02070309020205020404" pitchFamily="49" charset="0"/>
+                    <a:cs typeface="Courier New" panose="02070309020205020404" pitchFamily="49" charset="0"/>
+                  </a:rPr>
+                  <a:t>eq.refl</a:t>
+                </a:r>
+                <a:r>
+                  <a:rPr lang="en-US" sz="2400" dirty="0">
+                    <a:latin typeface="Courier New" panose="02070309020205020404" pitchFamily="49" charset="0"/>
+                    <a:cs typeface="Courier New" panose="02070309020205020404" pitchFamily="49" charset="0"/>
+                  </a:rPr>
+                  <a:t> </a:t>
+                </a:r>
+                <a:r>
+                  <a:rPr lang="en-US" i="1" dirty="0"/>
+                  <a:t>t</a:t>
+                </a:r>
+                <a:r>
+                  <a:rPr lang="en-US" dirty="0"/>
+                  <a:t>, for the case when </a:t>
+                </a:r>
+                <a:r>
+                  <a:rPr lang="en-US" i="1" dirty="0"/>
+                  <a:t>t</a:t>
+                </a:r>
+                <a:r>
+                  <a:rPr lang="en-US" dirty="0"/>
+                  <a:t> = </a:t>
+                </a:r>
+                <a:r>
+                  <a:rPr lang="en-US" sz="2400" dirty="0" err="1">
+                    <a:latin typeface="Courier New" panose="02070309020205020404" pitchFamily="49" charset="0"/>
+                    <a:cs typeface="Courier New" panose="02070309020205020404" pitchFamily="49" charset="0"/>
+                  </a:rPr>
+                  <a:t>tt</a:t>
+                </a:r>
+                <a:r>
+                  <a:rPr lang="en-US" dirty="0"/>
+                  <a:t> and for the case when </a:t>
+                </a:r>
+                <a:r>
+                  <a:rPr lang="en-US" i="1" dirty="0"/>
+                  <a:t>t</a:t>
+                </a:r>
+                <a:r>
+                  <a:rPr lang="en-US" dirty="0"/>
+                  <a:t> = </a:t>
+                </a:r>
+                <a:r>
+                  <a:rPr lang="en-US" sz="2400" dirty="0">
+                    <a:latin typeface="Courier New" panose="02070309020205020404" pitchFamily="49" charset="0"/>
+                    <a:cs typeface="Courier New" panose="02070309020205020404" pitchFamily="49" charset="0"/>
+                  </a:rPr>
+                  <a:t>"Hello Lean!"</a:t>
+                </a:r>
+              </a:p>
+              <a:p>
+                <a:r>
+                  <a:rPr lang="en-US" dirty="0">
+                    <a:cs typeface="Courier New" panose="02070309020205020404" pitchFamily="49" charset="0"/>
+                  </a:rPr>
+                  <a:t>For the case when </a:t>
+                </a:r>
+                <a:r>
+                  <a:rPr lang="en-US" i="1" dirty="0"/>
+                  <a:t>t</a:t>
+                </a:r>
+                <a:r>
+                  <a:rPr lang="en-US" dirty="0"/>
+                  <a:t> = </a:t>
+                </a:r>
+                <a:r>
+                  <a:rPr lang="en-US" sz="2400" dirty="0" err="1">
+                    <a:latin typeface="Courier New" panose="02070309020205020404" pitchFamily="49" charset="0"/>
+                    <a:cs typeface="Courier New" panose="02070309020205020404" pitchFamily="49" charset="0"/>
+                  </a:rPr>
+                  <a:t>tt</a:t>
+                </a:r>
+                <a:r>
+                  <a:rPr lang="en-US" dirty="0">
+                    <a:cs typeface="Courier New" panose="02070309020205020404" pitchFamily="49" charset="0"/>
+                  </a:rPr>
+                  <a:t>, what value does Lean infer for the parameter, </a:t>
+                </a:r>
+                <a14:m>
+                  <m:oMath xmlns:m="http://schemas.openxmlformats.org/officeDocument/2006/math">
+                    <m:r>
+                      <a:rPr lang="en-US" i="1">
+                        <a:latin typeface="Cambria Math" panose="02040503050406030204" pitchFamily="18" charset="0"/>
+                      </a:rPr>
+                      <m:t>𝑇</m:t>
+                    </m:r>
+                  </m:oMath>
+                </a14:m>
+                <a:r>
+                  <a:rPr lang="en-US" dirty="0">
+                    <a:cs typeface="Courier New" panose="02070309020205020404" pitchFamily="49" charset="0"/>
+                  </a:rPr>
+                  <a:t>?</a:t>
+                </a:r>
+              </a:p>
+            </p:txBody>
+          </p:sp>
+        </mc:Choice>
+        <mc:Fallback>
+          <p:sp>
+            <p:nvSpPr>
+              <p:cNvPr id="3" name="Content Placeholder 2">
+                <a:extLst>
+                  <a:ext uri="{FF2B5EF4-FFF2-40B4-BE49-F238E27FC236}">
+                    <a16:creationId xmlns:a16="http://schemas.microsoft.com/office/drawing/2014/main" id="{CD284038-4C75-5743-9B2C-0656B82E145D}"/>
+                  </a:ext>
+                </a:extLst>
+              </p:cNvPr>
+              <p:cNvSpPr>
+                <a:spLocks noGrp="1" noRot="1" noChangeAspect="1" noMove="1" noResize="1" noEditPoints="1" noAdjustHandles="1" noChangeArrowheads="1" noChangeShapeType="1" noTextEdit="1"/>
+              </p:cNvSpPr>
+              <p:nvPr>
+                <p:ph idx="1"/>
+              </p:nvPr>
+            </p:nvSpPr>
+            <p:spPr>
+              <a:blipFill>
+                <a:blip r:embed="rId2"/>
+                <a:stretch>
+                  <a:fillRect l="-965" t="-2632" r="-1689"/>
+                </a:stretch>
+              </a:blipFill>
+            </p:spPr>
+            <p:txBody>
+              <a:bodyPr/>
+              <a:lstStyle/>
+              <a:p>
+                <a:r>
+                  <a:rPr lang="en-US">
+                    <a:noFill/>
+                  </a:rPr>
+                  <a:t> </a:t>
+                </a:r>
+              </a:p>
+            </p:txBody>
+          </p:sp>
+        </mc:Fallback>
+      </mc:AlternateContent>
+    </p:spTree>
+    <p:extLst>
+      <p:ext uri="{BB962C8B-B14F-4D97-AF65-F5344CB8AC3E}">
+        <p14:creationId xmlns:p14="http://schemas.microsoft.com/office/powerpoint/2010/main" val="632175078"/>
+      </p:ext>
+    </p:extLst>
+  </p:cSld>
+  <p:clrMapOvr>
+    <a:masterClrMapping/>
+  </p:clrMapOvr>
+</p:sld>
+</file>
+
+<file path=ppt/slides/slide13.xml><?xml version="1.0" encoding="utf-8"?>
+<p:sld xmlns:a="http://schemas.openxmlformats.org/drawingml/2006/main" xmlns:r="http://schemas.openxmlformats.org/officeDocument/2006/relationships" xmlns:p="http://schemas.openxmlformats.org/presentationml/2006/main">
+  <p:cSld>
     <p:bg>
       <p:bgPr>
         <a:solidFill>
@@ -4403,7 +4734,7 @@
                   <a:srgbClr val="FFFFFF"/>
                 </a:solidFill>
               </a:rPr>
-              <a:t>Type Inference</a:t>
+              <a:t>Propositions as Types</a:t>
             </a:r>
           </a:p>
         </p:txBody>
@@ -4456,7 +4787,7 @@
     </p:spTree>
     <p:extLst>
       <p:ext uri="{BB962C8B-B14F-4D97-AF65-F5344CB8AC3E}">
-        <p14:creationId xmlns:p14="http://schemas.microsoft.com/office/powerpoint/2010/main" val="2435349355"/>
+        <p14:creationId xmlns:p14="http://schemas.microsoft.com/office/powerpoint/2010/main" val="419791462"/>
       </p:ext>
     </p:extLst>
   </p:cSld>
@@ -4466,7 +4797,1099 @@
 </p:sld>
 </file>
 
-<file path=ppt/slides/slide12.xml><?xml version="1.0" encoding="utf-8"?>
+<file path=ppt/slides/slide14.xml><?xml version="1.0" encoding="utf-8"?>
+<p:sld xmlns:a="http://schemas.openxmlformats.org/drawingml/2006/main" xmlns:r="http://schemas.openxmlformats.org/officeDocument/2006/relationships" xmlns:p="http://schemas.openxmlformats.org/presentationml/2006/main">
+  <p:cSld>
+    <p:spTree>
+      <p:nvGrpSpPr>
+        <p:cNvPr id="1" name=""/>
+        <p:cNvGrpSpPr/>
+        <p:nvPr/>
+      </p:nvGrpSpPr>
+      <p:grpSpPr>
+        <a:xfrm>
+          <a:off x="0" y="0"/>
+          <a:ext cx="0" cy="0"/>
+          <a:chOff x="0" y="0"/>
+          <a:chExt cx="0" cy="0"/>
+        </a:xfrm>
+      </p:grpSpPr>
+      <p:sp>
+        <p:nvSpPr>
+          <p:cNvPr id="2" name="Title 1">
+            <a:extLst>
+              <a:ext uri="{FF2B5EF4-FFF2-40B4-BE49-F238E27FC236}">
+                <a16:creationId xmlns:a16="http://schemas.microsoft.com/office/drawing/2014/main" id="{91D2667E-9768-2945-B70F-B93818755FDA}"/>
+              </a:ext>
+            </a:extLst>
+          </p:cNvPr>
+          <p:cNvSpPr>
+            <a:spLocks noGrp="1"/>
+          </p:cNvSpPr>
+          <p:nvPr>
+            <p:ph type="title"/>
+          </p:nvPr>
+        </p:nvSpPr>
+        <p:spPr/>
+        <p:txBody>
+          <a:bodyPr/>
+          <a:lstStyle/>
+          <a:p>
+            <a:r>
+              <a:rPr lang="en-US" dirty="0"/>
+              <a:t>Propositions and Proofs</a:t>
+            </a:r>
+          </a:p>
+        </p:txBody>
+      </p:sp>
+      <p:sp>
+        <p:nvSpPr>
+          <p:cNvPr id="3" name="Content Placeholder 2">
+            <a:extLst>
+              <a:ext uri="{FF2B5EF4-FFF2-40B4-BE49-F238E27FC236}">
+                <a16:creationId xmlns:a16="http://schemas.microsoft.com/office/drawing/2014/main" id="{A23A5294-44C8-984B-AC85-29B0B4CBC27C}"/>
+              </a:ext>
+            </a:extLst>
+          </p:cNvPr>
+          <p:cNvSpPr>
+            <a:spLocks noGrp="1"/>
+          </p:cNvSpPr>
+          <p:nvPr>
+            <p:ph idx="1"/>
+          </p:nvPr>
+        </p:nvSpPr>
+        <p:spPr/>
+        <p:txBody>
+          <a:bodyPr/>
+          <a:lstStyle/>
+          <a:p>
+            <a:r>
+              <a:rPr lang="en-US" dirty="0"/>
+              <a:t>Recall that </a:t>
+            </a:r>
+            <a:r>
+              <a:rPr lang="en-US" dirty="0">
+                <a:latin typeface="Courier New" panose="02070309020205020404" pitchFamily="49" charset="0"/>
+                <a:cs typeface="Courier New" panose="02070309020205020404" pitchFamily="49" charset="0"/>
+              </a:rPr>
+              <a:t>#check (</a:t>
+            </a:r>
+            <a:r>
+              <a:rPr lang="en-US" dirty="0" err="1">
+                <a:latin typeface="Courier New" panose="02070309020205020404" pitchFamily="49" charset="0"/>
+                <a:cs typeface="Courier New" panose="02070309020205020404" pitchFamily="49" charset="0"/>
+              </a:rPr>
+              <a:t>eq.refl</a:t>
+            </a:r>
+            <a:r>
+              <a:rPr lang="en-US" dirty="0">
+                <a:latin typeface="Courier New" panose="02070309020205020404" pitchFamily="49" charset="0"/>
+                <a:cs typeface="Courier New" panose="02070309020205020404" pitchFamily="49" charset="0"/>
+              </a:rPr>
+              <a:t> 0)</a:t>
+            </a:r>
+            <a:r>
+              <a:rPr lang="en-US" dirty="0"/>
+              <a:t> we see that its </a:t>
+            </a:r>
+            <a:r>
+              <a:rPr lang="en-US" i="1" dirty="0"/>
+              <a:t>type</a:t>
+            </a:r>
+            <a:r>
+              <a:rPr lang="en-US" dirty="0"/>
+              <a:t> is reported as </a:t>
+            </a:r>
+            <a:r>
+              <a:rPr lang="en-US" dirty="0">
+                <a:latin typeface="Courier New" panose="02070309020205020404" pitchFamily="49" charset="0"/>
+                <a:cs typeface="Courier New" panose="02070309020205020404" pitchFamily="49" charset="0"/>
+              </a:rPr>
+              <a:t>0 = 0</a:t>
+            </a:r>
+            <a:r>
+              <a:rPr lang="en-US" dirty="0"/>
+              <a:t>!</a:t>
+            </a:r>
+          </a:p>
+          <a:p>
+            <a:r>
+              <a:rPr lang="en-US" dirty="0"/>
+              <a:t>Recall that </a:t>
+            </a:r>
+            <a:r>
+              <a:rPr lang="en-US" sz="2400" dirty="0">
+                <a:latin typeface="Courier New" panose="02070309020205020404" pitchFamily="49" charset="0"/>
+                <a:cs typeface="Courier New" panose="02070309020205020404" pitchFamily="49" charset="0"/>
+              </a:rPr>
+              <a:t>0 = 0</a:t>
+            </a:r>
+            <a:r>
+              <a:rPr lang="en-US" dirty="0"/>
+              <a:t> is a proposition.</a:t>
+            </a:r>
+          </a:p>
+          <a:p>
+            <a:r>
+              <a:rPr lang="en-US" dirty="0"/>
+              <a:t>What does it mean when that is reported as a type?</a:t>
+            </a:r>
+          </a:p>
+          <a:p>
+            <a:pPr lvl="1"/>
+            <a:r>
+              <a:rPr lang="en-US" dirty="0"/>
+              <a:t>These are the reported </a:t>
+            </a:r>
+            <a:r>
+              <a:rPr lang="en-US" i="1" dirty="0"/>
+              <a:t>types</a:t>
+            </a:r>
+            <a:r>
+              <a:rPr lang="en-US" dirty="0"/>
+              <a:t> of inference rules.</a:t>
+            </a:r>
+          </a:p>
+          <a:p>
+            <a:pPr lvl="1"/>
+            <a:r>
+              <a:rPr lang="en-US" dirty="0"/>
+              <a:t>Lean is reporting that the inference rule is of a proof </a:t>
+            </a:r>
+            <a:r>
+              <a:rPr lang="en-US" i="1" dirty="0"/>
+              <a:t>type</a:t>
+            </a:r>
+            <a:r>
+              <a:rPr lang="en-US" dirty="0"/>
+              <a:t> that satisfies the proposition </a:t>
+            </a:r>
+            <a:r>
+              <a:rPr lang="en-US" dirty="0">
+                <a:latin typeface="Courier New" panose="02070309020205020404" pitchFamily="49" charset="0"/>
+                <a:cs typeface="Courier New" panose="02070309020205020404" pitchFamily="49" charset="0"/>
+              </a:rPr>
+              <a:t>0 = 0</a:t>
+            </a:r>
+            <a:r>
+              <a:rPr lang="en-US" dirty="0"/>
+              <a:t>.</a:t>
+            </a:r>
+          </a:p>
+        </p:txBody>
+      </p:sp>
+    </p:spTree>
+    <p:extLst>
+      <p:ext uri="{BB962C8B-B14F-4D97-AF65-F5344CB8AC3E}">
+        <p14:creationId xmlns:p14="http://schemas.microsoft.com/office/powerpoint/2010/main" val="1779611645"/>
+      </p:ext>
+    </p:extLst>
+  </p:cSld>
+  <p:clrMapOvr>
+    <a:masterClrMapping/>
+  </p:clrMapOvr>
+</p:sld>
+</file>
+
+<file path=ppt/slides/slide15.xml><?xml version="1.0" encoding="utf-8"?>
+<p:sld xmlns:a="http://schemas.openxmlformats.org/drawingml/2006/main" xmlns:r="http://schemas.openxmlformats.org/officeDocument/2006/relationships" xmlns:p="http://schemas.openxmlformats.org/presentationml/2006/main">
+  <p:cSld>
+    <p:spTree>
+      <p:nvGrpSpPr>
+        <p:cNvPr id="1" name=""/>
+        <p:cNvGrpSpPr/>
+        <p:nvPr/>
+      </p:nvGrpSpPr>
+      <p:grpSpPr>
+        <a:xfrm>
+          <a:off x="0" y="0"/>
+          <a:ext cx="0" cy="0"/>
+          <a:chOff x="0" y="0"/>
+          <a:chExt cx="0" cy="0"/>
+        </a:xfrm>
+      </p:grpSpPr>
+      <p:sp>
+        <p:nvSpPr>
+          <p:cNvPr id="2" name="Title 1">
+            <a:extLst>
+              <a:ext uri="{FF2B5EF4-FFF2-40B4-BE49-F238E27FC236}">
+                <a16:creationId xmlns:a16="http://schemas.microsoft.com/office/drawing/2014/main" id="{D3737192-F770-D146-926C-7211225130F4}"/>
+              </a:ext>
+            </a:extLst>
+          </p:cNvPr>
+          <p:cNvSpPr>
+            <a:spLocks noGrp="1"/>
+          </p:cNvSpPr>
+          <p:nvPr>
+            <p:ph type="title"/>
+          </p:nvPr>
+        </p:nvSpPr>
+        <p:spPr/>
+        <p:txBody>
+          <a:bodyPr/>
+          <a:lstStyle/>
+          <a:p>
+            <a:r>
+              <a:rPr lang="en-US" dirty="0"/>
+              <a:t>Types in General</a:t>
+            </a:r>
+          </a:p>
+        </p:txBody>
+      </p:sp>
+      <p:sp>
+        <p:nvSpPr>
+          <p:cNvPr id="3" name="Content Placeholder 2">
+            <a:extLst>
+              <a:ext uri="{FF2B5EF4-FFF2-40B4-BE49-F238E27FC236}">
+                <a16:creationId xmlns:a16="http://schemas.microsoft.com/office/drawing/2014/main" id="{52D419AB-76AD-BD4B-8FEF-E1F4E8A71F50}"/>
+              </a:ext>
+            </a:extLst>
+          </p:cNvPr>
+          <p:cNvSpPr>
+            <a:spLocks noGrp="1"/>
+          </p:cNvSpPr>
+          <p:nvPr>
+            <p:ph idx="1"/>
+          </p:nvPr>
+        </p:nvSpPr>
+        <p:spPr/>
+        <p:txBody>
+          <a:bodyPr>
+            <a:normAutofit fontScale="92500" lnSpcReduction="20000"/>
+          </a:bodyPr>
+          <a:lstStyle/>
+          <a:p>
+            <a:r>
+              <a:rPr lang="en-US" dirty="0"/>
+              <a:t>Recall that the type of 0 and 1 are of type </a:t>
+            </a:r>
+            <a:r>
+              <a:rPr lang="en-US" dirty="0" err="1"/>
+              <a:t>ℕ</a:t>
+            </a:r>
+            <a:r>
+              <a:rPr lang="en-US" dirty="0"/>
+              <a:t> in Lean</a:t>
+            </a:r>
+          </a:p>
+          <a:p>
+            <a:r>
+              <a:rPr lang="en-US" dirty="0"/>
+              <a:t>Other languages that rely on type inference might consider these to be of type </a:t>
+            </a:r>
+            <a:r>
+              <a:rPr lang="en-US" dirty="0" err="1"/>
+              <a:t>ℤ</a:t>
+            </a:r>
+            <a:endParaRPr lang="en-US" dirty="0"/>
+          </a:p>
+          <a:p>
+            <a:pPr lvl="1"/>
+            <a:r>
+              <a:rPr lang="en-US" dirty="0"/>
+              <a:t>Or more precisely of type IEEE 32-bit or 64-bit integers (signed or unsigned).</a:t>
+            </a:r>
+          </a:p>
+          <a:p>
+            <a:r>
+              <a:rPr lang="en-US" dirty="0"/>
+              <a:t>Many programming languages do type-checking, but how rigorous is that type-checking?</a:t>
+            </a:r>
+          </a:p>
+          <a:p>
+            <a:r>
+              <a:rPr lang="en-US" dirty="0"/>
+              <a:t>The maximum possible 32-bit unsigned integer is 4,294,967,295</a:t>
+            </a:r>
+          </a:p>
+          <a:p>
+            <a:pPr lvl="1"/>
+            <a:r>
+              <a:rPr lang="en-US" dirty="0"/>
+              <a:t>What is the type of 4,294,967,295 + 1?</a:t>
+            </a:r>
+          </a:p>
+          <a:p>
+            <a:r>
+              <a:rPr lang="en-US" dirty="0"/>
+              <a:t>In SPARK Ada, it’s not a 32-bit unsigned integer, and if you will be unable to do perform that computation and assign it to a 32-bit integer. SPARK Ada will type-check this at compile time!</a:t>
+            </a:r>
+          </a:p>
+          <a:p>
+            <a:r>
+              <a:rPr lang="en-US" dirty="0"/>
+              <a:t>Why does this matter?</a:t>
+            </a:r>
+          </a:p>
+          <a:p>
+            <a:endParaRPr lang="en-US" dirty="0"/>
+          </a:p>
+        </p:txBody>
+      </p:sp>
+    </p:spTree>
+    <p:extLst>
+      <p:ext uri="{BB962C8B-B14F-4D97-AF65-F5344CB8AC3E}">
+        <p14:creationId xmlns:p14="http://schemas.microsoft.com/office/powerpoint/2010/main" val="3940504705"/>
+      </p:ext>
+    </p:extLst>
+  </p:cSld>
+  <p:clrMapOvr>
+    <a:masterClrMapping/>
+  </p:clrMapOvr>
+</p:sld>
+</file>
+
+<file path=ppt/slides/slide16.xml><?xml version="1.0" encoding="utf-8"?>
+<p:sld xmlns:a="http://schemas.openxmlformats.org/drawingml/2006/main" xmlns:r="http://schemas.openxmlformats.org/officeDocument/2006/relationships" xmlns:p="http://schemas.openxmlformats.org/presentationml/2006/main">
+  <p:cSld>
+    <p:spTree>
+      <p:nvGrpSpPr>
+        <p:cNvPr id="1" name=""/>
+        <p:cNvGrpSpPr/>
+        <p:nvPr/>
+      </p:nvGrpSpPr>
+      <p:grpSpPr>
+        <a:xfrm>
+          <a:off x="0" y="0"/>
+          <a:ext cx="0" cy="0"/>
+          <a:chOff x="0" y="0"/>
+          <a:chExt cx="0" cy="0"/>
+        </a:xfrm>
+      </p:grpSpPr>
+      <p:sp>
+        <p:nvSpPr>
+          <p:cNvPr id="2" name="Title 1">
+            <a:extLst>
+              <a:ext uri="{FF2B5EF4-FFF2-40B4-BE49-F238E27FC236}">
+                <a16:creationId xmlns:a16="http://schemas.microsoft.com/office/drawing/2014/main" id="{C71EF8D7-0630-A44F-AE16-23626AB638DE}"/>
+              </a:ext>
+            </a:extLst>
+          </p:cNvPr>
+          <p:cNvSpPr>
+            <a:spLocks noGrp="1"/>
+          </p:cNvSpPr>
+          <p:nvPr>
+            <p:ph type="title"/>
+          </p:nvPr>
+        </p:nvSpPr>
+        <p:spPr/>
+        <p:txBody>
+          <a:bodyPr/>
+          <a:lstStyle/>
+          <a:p>
+            <a:r>
+              <a:rPr lang="en-US" dirty="0"/>
+              <a:t>Boeing 787 Dreamliner Integer Overflow</a:t>
+            </a:r>
+          </a:p>
+        </p:txBody>
+      </p:sp>
+      <p:sp>
+        <p:nvSpPr>
+          <p:cNvPr id="3" name="Content Placeholder 2">
+            <a:extLst>
+              <a:ext uri="{FF2B5EF4-FFF2-40B4-BE49-F238E27FC236}">
+                <a16:creationId xmlns:a16="http://schemas.microsoft.com/office/drawing/2014/main" id="{366ED2F0-3213-E54B-953A-39CAF84755D6}"/>
+              </a:ext>
+            </a:extLst>
+          </p:cNvPr>
+          <p:cNvSpPr>
+            <a:spLocks noGrp="1"/>
+          </p:cNvSpPr>
+          <p:nvPr>
+            <p:ph idx="1"/>
+          </p:nvPr>
+        </p:nvSpPr>
+        <p:spPr/>
+        <p:txBody>
+          <a:bodyPr/>
+          <a:lstStyle/>
+          <a:p>
+            <a:r>
+              <a:rPr lang="en-US" dirty="0"/>
+              <a:t>From Ars Technica: </a:t>
+            </a:r>
+            <a:r>
+              <a:rPr lang="en-US" dirty="0">
+                <a:hlinkClick r:id="rId2"/>
+              </a:rPr>
+              <a:t>Boeing 787 </a:t>
+            </a:r>
+            <a:r>
+              <a:rPr lang="en-US" dirty="0" err="1">
+                <a:hlinkClick r:id="rId2"/>
+              </a:rPr>
+              <a:t>Dreamliners</a:t>
+            </a:r>
+            <a:r>
+              <a:rPr lang="en-US" dirty="0">
+                <a:hlinkClick r:id="rId2"/>
+              </a:rPr>
+              <a:t> contain a potentially catastrophic software bug</a:t>
+            </a:r>
+            <a:endParaRPr lang="en-US" dirty="0"/>
+          </a:p>
+          <a:p>
+            <a:r>
+              <a:rPr lang="en-US" dirty="0"/>
+              <a:t>“[A] Model 787 airplane that has been powered continuously for 248 days can lose all alternating current (AC) electrical power due to the generator control units (GCUs) simultaneously going into failsafe mode”</a:t>
+            </a:r>
+          </a:p>
+          <a:p>
+            <a:r>
+              <a:rPr lang="en-US" dirty="0"/>
+              <a:t>If this code had been written in SPARK Ada (or with a similarly strong type-checker), this defect would never have gotten onto the plane</a:t>
+            </a:r>
+          </a:p>
+          <a:p>
+            <a:r>
+              <a:rPr lang="en-US" dirty="0"/>
+              <a:t>This is one reason why Discrete Math is so important to Computer Science!</a:t>
+            </a:r>
+          </a:p>
+        </p:txBody>
+      </p:sp>
+    </p:spTree>
+    <p:extLst>
+      <p:ext uri="{BB962C8B-B14F-4D97-AF65-F5344CB8AC3E}">
+        <p14:creationId xmlns:p14="http://schemas.microsoft.com/office/powerpoint/2010/main" val="2773981403"/>
+      </p:ext>
+    </p:extLst>
+  </p:cSld>
+  <p:clrMapOvr>
+    <a:masterClrMapping/>
+  </p:clrMapOvr>
+</p:sld>
+</file>
+
+<file path=ppt/slides/slide17.xml><?xml version="1.0" encoding="utf-8"?>
+<p:sld xmlns:a="http://schemas.openxmlformats.org/drawingml/2006/main" xmlns:r="http://schemas.openxmlformats.org/officeDocument/2006/relationships" xmlns:p="http://schemas.openxmlformats.org/presentationml/2006/main">
+  <p:cSld>
+    <p:spTree>
+      <p:nvGrpSpPr>
+        <p:cNvPr id="1" name=""/>
+        <p:cNvGrpSpPr/>
+        <p:nvPr/>
+      </p:nvGrpSpPr>
+      <p:grpSpPr>
+        <a:xfrm>
+          <a:off x="0" y="0"/>
+          <a:ext cx="0" cy="0"/>
+          <a:chOff x="0" y="0"/>
+          <a:chExt cx="0" cy="0"/>
+        </a:xfrm>
+      </p:grpSpPr>
+      <p:sp>
+        <p:nvSpPr>
+          <p:cNvPr id="2" name="Title 1">
+            <a:extLst>
+              <a:ext uri="{FF2B5EF4-FFF2-40B4-BE49-F238E27FC236}">
+                <a16:creationId xmlns:a16="http://schemas.microsoft.com/office/drawing/2014/main" id="{647A226E-5820-164A-BE14-8A6333B78A06}"/>
+              </a:ext>
+            </a:extLst>
+          </p:cNvPr>
+          <p:cNvSpPr>
+            <a:spLocks noGrp="1"/>
+          </p:cNvSpPr>
+          <p:nvPr>
+            <p:ph type="title"/>
+          </p:nvPr>
+        </p:nvSpPr>
+        <p:spPr/>
+        <p:txBody>
+          <a:bodyPr/>
+          <a:lstStyle/>
+          <a:p>
+            <a:r>
+              <a:rPr lang="en-US" dirty="0"/>
+              <a:t>Binding Types and Values to Variables in Lean</a:t>
+            </a:r>
+          </a:p>
+        </p:txBody>
+      </p:sp>
+      <p:sp>
+        <p:nvSpPr>
+          <p:cNvPr id="3" name="Content Placeholder 2">
+            <a:extLst>
+              <a:ext uri="{FF2B5EF4-FFF2-40B4-BE49-F238E27FC236}">
+                <a16:creationId xmlns:a16="http://schemas.microsoft.com/office/drawing/2014/main" id="{91E49CB3-6E26-A749-90AC-6A6888D8F7B9}"/>
+              </a:ext>
+            </a:extLst>
+          </p:cNvPr>
+          <p:cNvSpPr>
+            <a:spLocks noGrp="1"/>
+          </p:cNvSpPr>
+          <p:nvPr>
+            <p:ph idx="1"/>
+          </p:nvPr>
+        </p:nvSpPr>
+        <p:spPr/>
+        <p:txBody>
+          <a:bodyPr/>
+          <a:lstStyle/>
+          <a:p>
+            <a:r>
+              <a:rPr lang="en-US" dirty="0"/>
+              <a:t>To declare a variable n of type </a:t>
+            </a:r>
+            <a:r>
+              <a:rPr lang="en-US" dirty="0" err="1"/>
+              <a:t>ℕ</a:t>
+            </a:r>
+            <a:r>
+              <a:rPr lang="en-US" dirty="0"/>
+              <a:t> and with the value 1 in Lean:</a:t>
+            </a:r>
+            <a:br>
+              <a:rPr lang="en-US" dirty="0"/>
+            </a:br>
+            <a:r>
+              <a:rPr lang="en-US" sz="2400" dirty="0">
+                <a:latin typeface="Courier New" panose="02070309020205020404" pitchFamily="49" charset="0"/>
+                <a:cs typeface="Courier New" panose="02070309020205020404" pitchFamily="49" charset="0"/>
+              </a:rPr>
+              <a:t>def n      : </a:t>
+            </a:r>
+            <a:r>
+              <a:rPr lang="en-US" sz="2400" dirty="0" err="1">
+                <a:latin typeface="Courier New" panose="02070309020205020404" pitchFamily="49" charset="0"/>
+                <a:cs typeface="Courier New" panose="02070309020205020404" pitchFamily="49" charset="0"/>
+              </a:rPr>
+              <a:t>nat</a:t>
+            </a:r>
+            <a:r>
+              <a:rPr lang="en-US" sz="2400" dirty="0">
+                <a:latin typeface="Courier New" panose="02070309020205020404" pitchFamily="49" charset="0"/>
+                <a:cs typeface="Courier New" panose="02070309020205020404" pitchFamily="49" charset="0"/>
+              </a:rPr>
+              <a:t>  :=    1</a:t>
+            </a:r>
+            <a:br>
+              <a:rPr lang="en-US" sz="2400" dirty="0">
+                <a:latin typeface="Courier New" panose="02070309020205020404" pitchFamily="49" charset="0"/>
+                <a:cs typeface="Courier New" panose="02070309020205020404" pitchFamily="49" charset="0"/>
+              </a:rPr>
+            </a:br>
+            <a:r>
+              <a:rPr lang="en-US" sz="2400" dirty="0">
+                <a:latin typeface="Courier New" panose="02070309020205020404" pitchFamily="49" charset="0"/>
+                <a:cs typeface="Courier New" panose="02070309020205020404" pitchFamily="49" charset="0"/>
+              </a:rPr>
+              <a:t>-- variable  type bind  value</a:t>
+            </a:r>
+          </a:p>
+          <a:p>
+            <a:r>
+              <a:rPr lang="en-US" dirty="0"/>
+              <a:t>We can also create a variable </a:t>
+            </a:r>
+            <a:r>
+              <a:rPr lang="en-US" sz="2400" dirty="0">
+                <a:latin typeface="Courier New" panose="02070309020205020404" pitchFamily="49" charset="0"/>
+                <a:cs typeface="Courier New" panose="02070309020205020404" pitchFamily="49" charset="0"/>
+              </a:rPr>
+              <a:t>p</a:t>
+            </a:r>
+            <a:r>
+              <a:rPr lang="en-US" dirty="0"/>
+              <a:t> of type </a:t>
+            </a:r>
+            <a:r>
+              <a:rPr lang="en-US" sz="2400" dirty="0">
+                <a:latin typeface="Courier New" panose="02070309020205020404" pitchFamily="49" charset="0"/>
+                <a:cs typeface="Courier New" panose="02070309020205020404" pitchFamily="49" charset="0"/>
+              </a:rPr>
+              <a:t>0 = 0</a:t>
+            </a:r>
+            <a:r>
+              <a:rPr lang="en-US" dirty="0"/>
+              <a:t> (a proposition) and assign it a value of </a:t>
+            </a:r>
+            <a:r>
+              <a:rPr lang="en-US" sz="2400" dirty="0" err="1">
+                <a:latin typeface="Courier New" panose="02070309020205020404" pitchFamily="49" charset="0"/>
+                <a:cs typeface="Courier New" panose="02070309020205020404" pitchFamily="49" charset="0"/>
+              </a:rPr>
+              <a:t>eq.refl</a:t>
+            </a:r>
+            <a:r>
+              <a:rPr lang="en-US" sz="2400" dirty="0">
+                <a:latin typeface="Courier New" panose="02070309020205020404" pitchFamily="49" charset="0"/>
+                <a:cs typeface="Courier New" panose="02070309020205020404" pitchFamily="49" charset="0"/>
+              </a:rPr>
+              <a:t> 0</a:t>
+            </a:r>
+            <a:r>
+              <a:rPr lang="en-US" dirty="0"/>
+              <a:t> (a proof):</a:t>
+            </a:r>
+            <a:br>
+              <a:rPr lang="en-US" dirty="0"/>
+            </a:br>
+            <a:r>
+              <a:rPr lang="en-US" sz="2400" dirty="0">
+                <a:latin typeface="Courier New" panose="02070309020205020404" pitchFamily="49" charset="0"/>
+                <a:cs typeface="Courier New" panose="02070309020205020404" pitchFamily="49" charset="0"/>
+              </a:rPr>
+              <a:t>def p      : 0 = 0 :=   (</a:t>
+            </a:r>
+            <a:r>
+              <a:rPr lang="en-US" sz="2400" dirty="0" err="1">
+                <a:latin typeface="Courier New" panose="02070309020205020404" pitchFamily="49" charset="0"/>
+                <a:cs typeface="Courier New" panose="02070309020205020404" pitchFamily="49" charset="0"/>
+              </a:rPr>
+              <a:t>eq.refl</a:t>
+            </a:r>
+            <a:r>
+              <a:rPr lang="en-US" sz="2400" dirty="0">
+                <a:latin typeface="Courier New" panose="02070309020205020404" pitchFamily="49" charset="0"/>
+                <a:cs typeface="Courier New" panose="02070309020205020404" pitchFamily="49" charset="0"/>
+              </a:rPr>
+              <a:t> 0)</a:t>
+            </a:r>
+            <a:br>
+              <a:rPr lang="en-US" sz="2400" dirty="0">
+                <a:latin typeface="Courier New" panose="02070309020205020404" pitchFamily="49" charset="0"/>
+                <a:cs typeface="Courier New" panose="02070309020205020404" pitchFamily="49" charset="0"/>
+              </a:rPr>
+            </a:br>
+            <a:r>
+              <a:rPr lang="en-US" sz="2400" dirty="0">
+                <a:latin typeface="Courier New" panose="02070309020205020404" pitchFamily="49" charset="0"/>
+                <a:cs typeface="Courier New" panose="02070309020205020404" pitchFamily="49" charset="0"/>
+              </a:rPr>
+              <a:t>-- variable  type  bind  value</a:t>
+            </a:r>
+          </a:p>
+          <a:p>
+            <a:r>
+              <a:rPr lang="en-US" dirty="0"/>
+              <a:t>Because this is a proposition, however, </a:t>
+            </a:r>
+            <a:r>
+              <a:rPr lang="en-US" sz="2400" dirty="0">
+                <a:latin typeface="Courier New" panose="02070309020205020404" pitchFamily="49" charset="0"/>
+                <a:cs typeface="Courier New" panose="02070309020205020404" pitchFamily="49" charset="0"/>
+              </a:rPr>
+              <a:t>lemma</a:t>
+            </a:r>
+            <a:r>
+              <a:rPr lang="en-US" dirty="0"/>
+              <a:t> (or </a:t>
+            </a:r>
+            <a:r>
+              <a:rPr lang="en-US" sz="2400" dirty="0">
+                <a:latin typeface="Courier New" panose="02070309020205020404" pitchFamily="49" charset="0"/>
+                <a:cs typeface="Courier New" panose="02070309020205020404" pitchFamily="49" charset="0"/>
+              </a:rPr>
+              <a:t>theorem</a:t>
+            </a:r>
+            <a:r>
+              <a:rPr lang="en-US" dirty="0"/>
+              <a:t>) is preferred:</a:t>
+            </a:r>
+            <a:br>
+              <a:rPr lang="en-US" dirty="0"/>
+            </a:br>
+            <a:r>
+              <a:rPr lang="en-US" sz="2400" dirty="0">
+                <a:latin typeface="Courier New" panose="02070309020205020404" pitchFamily="49" charset="0"/>
+                <a:cs typeface="Courier New" panose="02070309020205020404" pitchFamily="49" charset="0"/>
+              </a:rPr>
+              <a:t>lemma p  : 0 = 0 :=   (</a:t>
+            </a:r>
+            <a:r>
+              <a:rPr lang="en-US" sz="2400" dirty="0" err="1">
+                <a:latin typeface="Courier New" panose="02070309020205020404" pitchFamily="49" charset="0"/>
+                <a:cs typeface="Courier New" panose="02070309020205020404" pitchFamily="49" charset="0"/>
+              </a:rPr>
+              <a:t>eq.refl</a:t>
+            </a:r>
+            <a:r>
+              <a:rPr lang="en-US" sz="2400" dirty="0">
+                <a:latin typeface="Courier New" panose="02070309020205020404" pitchFamily="49" charset="0"/>
+                <a:cs typeface="Courier New" panose="02070309020205020404" pitchFamily="49" charset="0"/>
+              </a:rPr>
+              <a:t> 0)</a:t>
+            </a:r>
+          </a:p>
+          <a:p>
+            <a:endParaRPr lang="en-US" dirty="0"/>
+          </a:p>
+        </p:txBody>
+      </p:sp>
+    </p:spTree>
+    <p:extLst>
+      <p:ext uri="{BB962C8B-B14F-4D97-AF65-F5344CB8AC3E}">
+        <p14:creationId xmlns:p14="http://schemas.microsoft.com/office/powerpoint/2010/main" val="678557997"/>
+      </p:ext>
+    </p:extLst>
+  </p:cSld>
+  <p:clrMapOvr>
+    <a:masterClrMapping/>
+  </p:clrMapOvr>
+</p:sld>
+</file>
+
+<file path=ppt/slides/slide18.xml><?xml version="1.0" encoding="utf-8"?>
+<p:sld xmlns:a="http://schemas.openxmlformats.org/drawingml/2006/main" xmlns:r="http://schemas.openxmlformats.org/officeDocument/2006/relationships" xmlns:p="http://schemas.openxmlformats.org/presentationml/2006/main">
+  <p:cSld>
+    <p:spTree>
+      <p:nvGrpSpPr>
+        <p:cNvPr id="1" name=""/>
+        <p:cNvGrpSpPr/>
+        <p:nvPr/>
+      </p:nvGrpSpPr>
+      <p:grpSpPr>
+        <a:xfrm>
+          <a:off x="0" y="0"/>
+          <a:ext cx="0" cy="0"/>
+          <a:chOff x="0" y="0"/>
+          <a:chExt cx="0" cy="0"/>
+        </a:xfrm>
+      </p:grpSpPr>
+      <p:sp>
+        <p:nvSpPr>
+          <p:cNvPr id="2" name="Title 1">
+            <a:extLst>
+              <a:ext uri="{FF2B5EF4-FFF2-40B4-BE49-F238E27FC236}">
+                <a16:creationId xmlns:a16="http://schemas.microsoft.com/office/drawing/2014/main" id="{B2DC227C-ECAD-B142-B911-F9B96226F149}"/>
+              </a:ext>
+            </a:extLst>
+          </p:cNvPr>
+          <p:cNvSpPr>
+            <a:spLocks noGrp="1"/>
+          </p:cNvSpPr>
+          <p:nvPr>
+            <p:ph type="title"/>
+          </p:nvPr>
+        </p:nvSpPr>
+        <p:spPr/>
+        <p:txBody>
+          <a:bodyPr/>
+          <a:lstStyle/>
+          <a:p>
+            <a:r>
+              <a:rPr lang="en-US" dirty="0"/>
+              <a:t>Exercises</a:t>
+            </a:r>
+          </a:p>
+        </p:txBody>
+      </p:sp>
+      <p:sp>
+        <p:nvSpPr>
+          <p:cNvPr id="3" name="Content Placeholder 2">
+            <a:extLst>
+              <a:ext uri="{FF2B5EF4-FFF2-40B4-BE49-F238E27FC236}">
+                <a16:creationId xmlns:a16="http://schemas.microsoft.com/office/drawing/2014/main" id="{EB93A5D2-334E-4E46-8B99-A77948F80152}"/>
+              </a:ext>
+            </a:extLst>
+          </p:cNvPr>
+          <p:cNvSpPr>
+            <a:spLocks noGrp="1"/>
+          </p:cNvSpPr>
+          <p:nvPr>
+            <p:ph idx="1"/>
+          </p:nvPr>
+        </p:nvSpPr>
+        <p:spPr/>
+        <p:txBody>
+          <a:bodyPr>
+            <a:normAutofit/>
+          </a:bodyPr>
+          <a:lstStyle/>
+          <a:p>
+            <a:r>
+              <a:rPr lang="en-US" dirty="0"/>
+              <a:t>To the variable s, bind a proof of the proposition that "Hello Lean!" is equal to itself.</a:t>
+            </a:r>
+          </a:p>
+          <a:p>
+            <a:r>
+              <a:rPr lang="en-US" dirty="0"/>
+              <a:t>To the variable s, bind a proof of the proposition that </a:t>
+            </a:r>
+            <a:r>
+              <a:rPr lang="en-US" dirty="0" err="1"/>
+              <a:t>tt</a:t>
+            </a:r>
+            <a:r>
+              <a:rPr lang="en-US" dirty="0"/>
+              <a:t> is equal to itself.</a:t>
+            </a:r>
+          </a:p>
+          <a:p>
+            <a:r>
+              <a:rPr lang="en-US" dirty="0"/>
+              <a:t>Explain precisely why Lean reports an error for this code (see </a:t>
+            </a:r>
+            <a:r>
+              <a:rPr lang="en-US" sz="2400" dirty="0">
+                <a:latin typeface="Courier New" panose="02070309020205020404" pitchFamily="49" charset="0"/>
+                <a:cs typeface="Courier New" panose="02070309020205020404" pitchFamily="49" charset="0"/>
+              </a:rPr>
+              <a:t>01_Equality/04_propositions_as_types.lean</a:t>
+            </a:r>
+            <a:r>
+              <a:rPr lang="en-US" dirty="0"/>
+              <a:t>) and what it means:</a:t>
+            </a:r>
+            <a:br>
+              <a:rPr lang="en-US" dirty="0"/>
+            </a:br>
+            <a:r>
+              <a:rPr lang="en-US" sz="2400" dirty="0">
+                <a:latin typeface="Courier New" panose="02070309020205020404" pitchFamily="49" charset="0"/>
+                <a:cs typeface="Courier New" panose="02070309020205020404" pitchFamily="49" charset="0"/>
+              </a:rPr>
+              <a:t>def p' : 0 = 0 := (</a:t>
+            </a:r>
+            <a:r>
+              <a:rPr lang="en-US" sz="2400" dirty="0" err="1">
+                <a:latin typeface="Courier New" panose="02070309020205020404" pitchFamily="49" charset="0"/>
+                <a:cs typeface="Courier New" panose="02070309020205020404" pitchFamily="49" charset="0"/>
+              </a:rPr>
+              <a:t>eq.refl</a:t>
+            </a:r>
+            <a:r>
+              <a:rPr lang="en-US" sz="2400" dirty="0">
+                <a:latin typeface="Courier New" panose="02070309020205020404" pitchFamily="49" charset="0"/>
+                <a:cs typeface="Courier New" panose="02070309020205020404" pitchFamily="49" charset="0"/>
+              </a:rPr>
+              <a:t> 1)</a:t>
+            </a:r>
+          </a:p>
+          <a:p>
+            <a:r>
+              <a:rPr lang="en-US" dirty="0"/>
+              <a:t>Use </a:t>
+            </a:r>
+            <a:r>
+              <a:rPr lang="en-US" sz="2400" dirty="0">
+                <a:latin typeface="Courier New" panose="02070309020205020404" pitchFamily="49" charset="0"/>
+                <a:cs typeface="Courier New" panose="02070309020205020404" pitchFamily="49" charset="0"/>
+              </a:rPr>
+              <a:t>theorem</a:t>
+            </a:r>
+            <a:r>
+              <a:rPr lang="en-US" dirty="0"/>
+              <a:t> instead of def to bind a proof of 0 = 0 to a variable, s'.</a:t>
+            </a:r>
+          </a:p>
+          <a:p>
+            <a:endParaRPr lang="en-US" dirty="0"/>
+          </a:p>
+          <a:p>
+            <a:endParaRPr lang="en-US" dirty="0"/>
+          </a:p>
+        </p:txBody>
+      </p:sp>
+    </p:spTree>
+    <p:extLst>
+      <p:ext uri="{BB962C8B-B14F-4D97-AF65-F5344CB8AC3E}">
+        <p14:creationId xmlns:p14="http://schemas.microsoft.com/office/powerpoint/2010/main" val="3734771908"/>
+      </p:ext>
+    </p:extLst>
+  </p:cSld>
+  <p:clrMapOvr>
+    <a:masterClrMapping/>
+  </p:clrMapOvr>
+</p:sld>
+</file>
+
+<file path=ppt/slides/slide19.xml><?xml version="1.0" encoding="utf-8"?>
+<p:sld xmlns:a="http://schemas.openxmlformats.org/drawingml/2006/main" xmlns:r="http://schemas.openxmlformats.org/officeDocument/2006/relationships" xmlns:p="http://schemas.openxmlformats.org/presentationml/2006/main">
+  <p:cSld>
+    <p:spTree>
+      <p:nvGrpSpPr>
+        <p:cNvPr id="1" name=""/>
+        <p:cNvGrpSpPr/>
+        <p:nvPr/>
+      </p:nvGrpSpPr>
+      <p:grpSpPr>
+        <a:xfrm>
+          <a:off x="0" y="0"/>
+          <a:ext cx="0" cy="0"/>
+          <a:chOff x="0" y="0"/>
+          <a:chExt cx="0" cy="0"/>
+        </a:xfrm>
+      </p:grpSpPr>
+      <p:sp>
+        <p:nvSpPr>
+          <p:cNvPr id="2" name="Title 1">
+            <a:extLst>
+              <a:ext uri="{FF2B5EF4-FFF2-40B4-BE49-F238E27FC236}">
+                <a16:creationId xmlns:a16="http://schemas.microsoft.com/office/drawing/2014/main" id="{EDD87942-CCAF-624F-BF5E-E4CAD742B969}"/>
+              </a:ext>
+            </a:extLst>
+          </p:cNvPr>
+          <p:cNvSpPr>
+            <a:spLocks noGrp="1"/>
+          </p:cNvSpPr>
+          <p:nvPr>
+            <p:ph type="title"/>
+          </p:nvPr>
+        </p:nvSpPr>
+        <p:spPr/>
+        <p:txBody>
+          <a:bodyPr/>
+          <a:lstStyle/>
+          <a:p>
+            <a:r>
+              <a:rPr lang="en-US" dirty="0"/>
+              <a:t>More Exercises</a:t>
+            </a:r>
+          </a:p>
+        </p:txBody>
+      </p:sp>
+      <p:sp>
+        <p:nvSpPr>
+          <p:cNvPr id="3" name="Content Placeholder 2">
+            <a:extLst>
+              <a:ext uri="{FF2B5EF4-FFF2-40B4-BE49-F238E27FC236}">
+                <a16:creationId xmlns:a16="http://schemas.microsoft.com/office/drawing/2014/main" id="{E1470B0C-99AE-7C4F-AC7B-FCD3ED95723A}"/>
+              </a:ext>
+            </a:extLst>
+          </p:cNvPr>
+          <p:cNvSpPr>
+            <a:spLocks noGrp="1"/>
+          </p:cNvSpPr>
+          <p:nvPr>
+            <p:ph idx="1"/>
+          </p:nvPr>
+        </p:nvSpPr>
+        <p:spPr/>
+        <p:txBody>
+          <a:bodyPr/>
+          <a:lstStyle/>
+          <a:p>
+            <a:r>
+              <a:rPr lang="en-US" dirty="0"/>
+              <a:t>Prove theorems for the following propositions:</a:t>
+            </a:r>
+          </a:p>
+          <a:p>
+            <a:pPr lvl="1"/>
+            <a:r>
+              <a:rPr lang="en-US" dirty="0" err="1"/>
+              <a:t>oeqo</a:t>
+            </a:r>
+            <a:r>
+              <a:rPr lang="en-US" dirty="0"/>
+              <a:t> : 1 = 1</a:t>
+            </a:r>
+          </a:p>
+          <a:p>
+            <a:pPr lvl="1"/>
+            <a:r>
+              <a:rPr lang="en-US" dirty="0" err="1"/>
+              <a:t>heqh</a:t>
+            </a:r>
+            <a:r>
+              <a:rPr lang="en-US" dirty="0"/>
+              <a:t> : "Hello Lean! = Hello Lean!"</a:t>
+            </a:r>
+          </a:p>
+          <a:p>
+            <a:pPr lvl="1"/>
+            <a:r>
+              <a:rPr lang="en-US" dirty="0" err="1"/>
+              <a:t>teqt</a:t>
+            </a:r>
+            <a:r>
+              <a:rPr lang="en-US" dirty="0"/>
+              <a:t> : 2 = 1 + 1</a:t>
+            </a:r>
+          </a:p>
+          <a:p>
+            <a:r>
+              <a:rPr lang="en-US" dirty="0"/>
+              <a:t>What is the type of </a:t>
+            </a:r>
+            <a:r>
+              <a:rPr lang="en-US" sz="2400" dirty="0">
+                <a:latin typeface="Courier New" panose="02070309020205020404" pitchFamily="49" charset="0"/>
+                <a:cs typeface="Courier New" panose="02070309020205020404" pitchFamily="49" charset="0"/>
+              </a:rPr>
+              <a:t>(0 = 1)</a:t>
+            </a:r>
+            <a:r>
+              <a:rPr lang="en-US" dirty="0"/>
+              <a:t> in Lean? Answer before you </a:t>
+            </a:r>
+            <a:r>
+              <a:rPr lang="en-US" sz="2400" dirty="0">
+                <a:latin typeface="Courier New" panose="02070309020205020404" pitchFamily="49" charset="0"/>
+                <a:cs typeface="Courier New" panose="02070309020205020404" pitchFamily="49" charset="0"/>
+              </a:rPr>
+              <a:t>#check </a:t>
+            </a:r>
+            <a:r>
+              <a:rPr lang="en-US" dirty="0"/>
+              <a:t>it, then </a:t>
+            </a:r>
+            <a:r>
+              <a:rPr lang="en-US" sz="2400" dirty="0">
+                <a:latin typeface="Courier New" panose="02070309020205020404" pitchFamily="49" charset="0"/>
+                <a:cs typeface="Courier New" panose="02070309020205020404" pitchFamily="49" charset="0"/>
+              </a:rPr>
+              <a:t>#check</a:t>
+            </a:r>
+            <a:r>
+              <a:rPr lang="en-US" dirty="0"/>
+              <a:t> it to confirm. (see </a:t>
+            </a:r>
+            <a:r>
+              <a:rPr lang="en-US" dirty="0">
+                <a:latin typeface="Courier New" panose="02070309020205020404" pitchFamily="49" charset="0"/>
+                <a:cs typeface="Courier New" panose="02070309020205020404" pitchFamily="49" charset="0"/>
+              </a:rPr>
+              <a:t>01_Equality/04_propositions_as_types.lean</a:t>
+            </a:r>
+            <a:r>
+              <a:rPr lang="en-US" dirty="0"/>
+              <a:t>)</a:t>
+            </a:r>
+          </a:p>
+          <a:p>
+            <a:r>
+              <a:rPr lang="en-US" dirty="0"/>
+              <a:t>What is the type of </a:t>
+            </a:r>
+            <a:r>
+              <a:rPr lang="en-US" sz="2400" dirty="0">
+                <a:latin typeface="Courier New" panose="02070309020205020404" pitchFamily="49" charset="0"/>
+                <a:cs typeface="Courier New" panose="02070309020205020404" pitchFamily="49" charset="0"/>
+              </a:rPr>
+              <a:t>"Hello Lean" = "Hello Lean"</a:t>
+            </a:r>
+            <a:r>
+              <a:rPr lang="en-US" dirty="0"/>
+              <a:t> in Lean?</a:t>
+            </a:r>
+          </a:p>
+          <a:p>
+            <a:endParaRPr lang="en-US" dirty="0"/>
+          </a:p>
+          <a:p>
+            <a:endParaRPr lang="en-US" dirty="0"/>
+          </a:p>
+        </p:txBody>
+      </p:sp>
+    </p:spTree>
+    <p:extLst>
+      <p:ext uri="{BB962C8B-B14F-4D97-AF65-F5344CB8AC3E}">
+        <p14:creationId xmlns:p14="http://schemas.microsoft.com/office/powerpoint/2010/main" val="4271820982"/>
+      </p:ext>
+    </p:extLst>
+  </p:cSld>
+  <p:clrMapOvr>
+    <a:masterClrMapping/>
+  </p:clrMapOvr>
+</p:sld>
+</file>
+
+<file path=ppt/slides/slide2.xml><?xml version="1.0" encoding="utf-8"?>
 <p:sld xmlns:a="http://schemas.openxmlformats.org/drawingml/2006/main" xmlns:r="http://schemas.openxmlformats.org/officeDocument/2006/relationships" xmlns:p="http://schemas.openxmlformats.org/presentationml/2006/main">
   <p:cSld>
     <p:bg>
@@ -4600,12 +6023,96 @@
           <a:p>
             <a:pPr algn="ctr"/>
             <a:r>
-              <a:rPr lang="en-US" sz="6000" dirty="0">
+              <a:rPr lang="en-US" sz="6000" kern="1200">
+                <a:solidFill>
+                  <a:srgbClr val="FFFFFF"/>
+                </a:solidFill>
+                <a:latin typeface="+mj-lt"/>
+                <a:ea typeface="+mj-ea"/>
+                <a:cs typeface="+mj-cs"/>
+              </a:rPr>
+              <a:t>Contents</a:t>
+            </a:r>
+          </a:p>
+        </p:txBody>
+      </p:sp>
+      <p:sp>
+        <p:nvSpPr>
+          <p:cNvPr id="3" name="Content Placeholder 2"/>
+          <p:cNvSpPr>
+            <a:spLocks noGrp="1"/>
+          </p:cNvSpPr>
+          <p:nvPr>
+            <p:ph type="body" idx="1"/>
+          </p:nvPr>
+        </p:nvSpPr>
+        <p:spPr>
+          <a:xfrm>
+            <a:off x="3045368" y="4074717"/>
+            <a:ext cx="6105194" cy="1672940"/>
+          </a:xfrm>
+        </p:spPr>
+        <p:txBody>
+          <a:bodyPr vert="horz" lIns="91440" tIns="45720" rIns="91440" bIns="45720" rtlCol="0">
+            <a:normAutofit fontScale="92500" lnSpcReduction="10000"/>
+          </a:bodyPr>
+          <a:lstStyle/>
+          <a:p>
+            <a:pPr marL="0" indent="0" algn="ctr">
+              <a:buNone/>
+            </a:pPr>
+            <a:r>
+              <a:rPr lang="en-US" sz="2400" kern="1200" dirty="0">
+                <a:solidFill>
+                  <a:srgbClr val="FFFFFF"/>
+                </a:solidFill>
+                <a:latin typeface="+mn-lt"/>
+                <a:ea typeface="+mn-ea"/>
+                <a:cs typeface="+mn-cs"/>
+              </a:rPr>
+              <a:t>Equality</a:t>
+            </a:r>
+          </a:p>
+          <a:p>
+            <a:pPr marL="0" indent="0" algn="ctr">
+              <a:buNone/>
+            </a:pPr>
+            <a:r>
+              <a:rPr lang="en-US" sz="2400" dirty="0">
                 <a:solidFill>
                   <a:srgbClr val="FFFFFF"/>
                 </a:solidFill>
               </a:rPr>
-              <a:t>Propositions as Types</a:t>
+              <a:t>Type judgments and inference</a:t>
+            </a:r>
+          </a:p>
+          <a:p>
+            <a:pPr marL="0" indent="0" algn="ctr">
+              <a:buNone/>
+            </a:pPr>
+            <a:r>
+              <a:rPr lang="en-US" sz="2400" dirty="0">
+                <a:solidFill>
+                  <a:srgbClr val="FFFFFF"/>
+                </a:solidFill>
+              </a:rPr>
+              <a:t>Propositions as types</a:t>
+            </a:r>
+          </a:p>
+          <a:p>
+            <a:pPr marL="0" indent="0" algn="ctr">
+              <a:buNone/>
+            </a:pPr>
+            <a:r>
+              <a:rPr lang="en-US" sz="2400" kern="1200" dirty="0">
+                <a:solidFill>
+                  <a:srgbClr val="FFFFFF"/>
+                </a:solidFill>
+                <a:latin typeface="+mn-lt"/>
+                <a:ea typeface="+mn-ea"/>
+                <a:cs typeface="+mn-cs"/>
+              </a:rPr>
+              <a:t>Automation</a:t>
             </a:r>
           </a:p>
         </p:txBody>
@@ -4634,7 +6141,7 @@
           </p:nvPr>
         </p:nvPicPr>
         <p:blipFill>
-          <a:blip r:embed="rId3">
+          <a:blip r:embed="rId2">
             <a:extLst>
               <a:ext uri="{28A0092B-C50C-407E-A947-70E740481C1C}">
                 <a14:useLocalDpi xmlns:a14="http://schemas.microsoft.com/office/drawing/2010/main" val="0"/>
@@ -4658,7 +6165,7 @@
     </p:spTree>
     <p:extLst>
       <p:ext uri="{BB962C8B-B14F-4D97-AF65-F5344CB8AC3E}">
-        <p14:creationId xmlns:p14="http://schemas.microsoft.com/office/powerpoint/2010/main" val="419791462"/>
+        <p14:creationId xmlns:p14="http://schemas.microsoft.com/office/powerpoint/2010/main" val="699473533"/>
       </p:ext>
     </p:extLst>
   </p:cSld>
@@ -4668,7 +6175,874 @@
 </p:sld>
 </file>
 
-<file path=ppt/slides/slide13.xml><?xml version="1.0" encoding="utf-8"?>
+<file path=ppt/slides/slide20.xml><?xml version="1.0" encoding="utf-8"?>
+<p:sld xmlns:a="http://schemas.openxmlformats.org/drawingml/2006/main" xmlns:r="http://schemas.openxmlformats.org/officeDocument/2006/relationships" xmlns:p="http://schemas.openxmlformats.org/presentationml/2006/main">
+  <p:cSld>
+    <p:spTree>
+      <p:nvGrpSpPr>
+        <p:cNvPr id="1" name=""/>
+        <p:cNvGrpSpPr/>
+        <p:nvPr/>
+      </p:nvGrpSpPr>
+      <p:grpSpPr>
+        <a:xfrm>
+          <a:off x="0" y="0"/>
+          <a:ext cx="0" cy="0"/>
+          <a:chOff x="0" y="0"/>
+          <a:chExt cx="0" cy="0"/>
+        </a:xfrm>
+      </p:grpSpPr>
+      <p:sp>
+        <p:nvSpPr>
+          <p:cNvPr id="2" name="Title 1">
+            <a:extLst>
+              <a:ext uri="{FF2B5EF4-FFF2-40B4-BE49-F238E27FC236}">
+                <a16:creationId xmlns:a16="http://schemas.microsoft.com/office/drawing/2014/main" id="{C599BF6C-3765-504E-B3B0-8C790E80F406}"/>
+              </a:ext>
+            </a:extLst>
+          </p:cNvPr>
+          <p:cNvSpPr>
+            <a:spLocks noGrp="1"/>
+          </p:cNvSpPr>
+          <p:nvPr>
+            <p:ph type="title"/>
+          </p:nvPr>
+        </p:nvSpPr>
+        <p:spPr/>
+        <p:txBody>
+          <a:bodyPr/>
+          <a:lstStyle/>
+          <a:p>
+            <a:r>
+              <a:rPr lang="en-US" dirty="0"/>
+              <a:t>Proofs and Propositions as Types in Lean</a:t>
+            </a:r>
+          </a:p>
+        </p:txBody>
+      </p:sp>
+      <p:sp>
+        <p:nvSpPr>
+          <p:cNvPr id="5" name="TextBox 4">
+            <a:extLst>
+              <a:ext uri="{FF2B5EF4-FFF2-40B4-BE49-F238E27FC236}">
+                <a16:creationId xmlns:a16="http://schemas.microsoft.com/office/drawing/2014/main" id="{0E88109C-7D6F-B446-B056-2E4C01D3C4D4}"/>
+              </a:ext>
+            </a:extLst>
+          </p:cNvPr>
+          <p:cNvSpPr txBox="1"/>
+          <p:nvPr/>
+        </p:nvSpPr>
+        <p:spPr>
+          <a:xfrm>
+            <a:off x="987552" y="1875354"/>
+            <a:ext cx="1393458" cy="523220"/>
+          </a:xfrm>
+          <a:prstGeom prst="rect">
+            <a:avLst/>
+          </a:prstGeom>
+          <a:noFill/>
+          <a:ln w="25400">
+            <a:solidFill>
+              <a:schemeClr val="accent1"/>
+            </a:solidFill>
+          </a:ln>
+        </p:spPr>
+        <p:txBody>
+          <a:bodyPr wrap="none" rtlCol="0">
+            <a:spAutoFit/>
+          </a:bodyPr>
+          <a:lstStyle/>
+          <a:p>
+            <a:r>
+              <a:rPr lang="en-US" sz="2800" dirty="0" err="1"/>
+              <a:t>eq.refl</a:t>
+            </a:r>
+            <a:r>
+              <a:rPr lang="en-US" sz="2800" dirty="0"/>
+              <a:t> 0</a:t>
+            </a:r>
+          </a:p>
+        </p:txBody>
+      </p:sp>
+      <p:sp>
+        <p:nvSpPr>
+          <p:cNvPr id="6" name="TextBox 5">
+            <a:extLst>
+              <a:ext uri="{FF2B5EF4-FFF2-40B4-BE49-F238E27FC236}">
+                <a16:creationId xmlns:a16="http://schemas.microsoft.com/office/drawing/2014/main" id="{14496435-9DBF-564F-9F38-75F349DB9959}"/>
+              </a:ext>
+            </a:extLst>
+          </p:cNvPr>
+          <p:cNvSpPr txBox="1"/>
+          <p:nvPr/>
+        </p:nvSpPr>
+        <p:spPr>
+          <a:xfrm>
+            <a:off x="2951302" y="1860948"/>
+            <a:ext cx="893193" cy="523220"/>
+          </a:xfrm>
+          <a:prstGeom prst="rect">
+            <a:avLst/>
+          </a:prstGeom>
+          <a:noFill/>
+          <a:ln w="25400">
+            <a:solidFill>
+              <a:schemeClr val="accent1"/>
+            </a:solidFill>
+          </a:ln>
+        </p:spPr>
+        <p:txBody>
+          <a:bodyPr wrap="none" rtlCol="0">
+            <a:spAutoFit/>
+          </a:bodyPr>
+          <a:lstStyle/>
+          <a:p>
+            <a:r>
+              <a:rPr lang="en-US" sz="2800" dirty="0"/>
+              <a:t>0 = 0</a:t>
+            </a:r>
+          </a:p>
+        </p:txBody>
+      </p:sp>
+      <p:sp>
+        <p:nvSpPr>
+          <p:cNvPr id="7" name="TextBox 6">
+            <a:extLst>
+              <a:ext uri="{FF2B5EF4-FFF2-40B4-BE49-F238E27FC236}">
+                <a16:creationId xmlns:a16="http://schemas.microsoft.com/office/drawing/2014/main" id="{A81247C4-1633-8341-909D-33D78E8B753B}"/>
+              </a:ext>
+            </a:extLst>
+          </p:cNvPr>
+          <p:cNvSpPr txBox="1"/>
+          <p:nvPr/>
+        </p:nvSpPr>
+        <p:spPr>
+          <a:xfrm>
+            <a:off x="4435635" y="1860948"/>
+            <a:ext cx="868186" cy="523220"/>
+          </a:xfrm>
+          <a:prstGeom prst="rect">
+            <a:avLst/>
+          </a:prstGeom>
+          <a:noFill/>
+          <a:ln w="25400">
+            <a:solidFill>
+              <a:schemeClr val="accent1"/>
+            </a:solidFill>
+          </a:ln>
+        </p:spPr>
+        <p:txBody>
+          <a:bodyPr wrap="none" rtlCol="0">
+            <a:spAutoFit/>
+          </a:bodyPr>
+          <a:lstStyle/>
+          <a:p>
+            <a:r>
+              <a:rPr lang="en-US" sz="2800" dirty="0"/>
+              <a:t>Prop</a:t>
+            </a:r>
+          </a:p>
+        </p:txBody>
+      </p:sp>
+      <p:sp>
+        <p:nvSpPr>
+          <p:cNvPr id="8" name="TextBox 7">
+            <a:extLst>
+              <a:ext uri="{FF2B5EF4-FFF2-40B4-BE49-F238E27FC236}">
+                <a16:creationId xmlns:a16="http://schemas.microsoft.com/office/drawing/2014/main" id="{52A973B0-5319-0B41-A8DE-9BDBF59F3459}"/>
+              </a:ext>
+            </a:extLst>
+          </p:cNvPr>
+          <p:cNvSpPr txBox="1"/>
+          <p:nvPr/>
+        </p:nvSpPr>
+        <p:spPr>
+          <a:xfrm>
+            <a:off x="3477087" y="3015835"/>
+            <a:ext cx="367408" cy="523220"/>
+          </a:xfrm>
+          <a:prstGeom prst="rect">
+            <a:avLst/>
+          </a:prstGeom>
+          <a:noFill/>
+          <a:ln w="25400">
+            <a:solidFill>
+              <a:schemeClr val="accent1"/>
+            </a:solidFill>
+          </a:ln>
+        </p:spPr>
+        <p:txBody>
+          <a:bodyPr wrap="none" rtlCol="0">
+            <a:spAutoFit/>
+          </a:bodyPr>
+          <a:lstStyle/>
+          <a:p>
+            <a:r>
+              <a:rPr lang="en-US" sz="2800" dirty="0"/>
+              <a:t>1</a:t>
+            </a:r>
+          </a:p>
+        </p:txBody>
+      </p:sp>
+      <p:sp>
+        <p:nvSpPr>
+          <p:cNvPr id="9" name="TextBox 8">
+            <a:extLst>
+              <a:ext uri="{FF2B5EF4-FFF2-40B4-BE49-F238E27FC236}">
+                <a16:creationId xmlns:a16="http://schemas.microsoft.com/office/drawing/2014/main" id="{0E0D71FB-9861-D742-AF2F-CF7CA4009173}"/>
+              </a:ext>
+            </a:extLst>
+          </p:cNvPr>
+          <p:cNvSpPr txBox="1"/>
+          <p:nvPr/>
+        </p:nvSpPr>
+        <p:spPr>
+          <a:xfrm>
+            <a:off x="4635461" y="3015835"/>
+            <a:ext cx="662233" cy="523220"/>
+          </a:xfrm>
+          <a:prstGeom prst="rect">
+            <a:avLst/>
+          </a:prstGeom>
+          <a:noFill/>
+          <a:ln w="25400">
+            <a:solidFill>
+              <a:schemeClr val="accent1"/>
+            </a:solidFill>
+          </a:ln>
+        </p:spPr>
+        <p:txBody>
+          <a:bodyPr wrap="none" rtlCol="0">
+            <a:spAutoFit/>
+          </a:bodyPr>
+          <a:lstStyle/>
+          <a:p>
+            <a:r>
+              <a:rPr lang="en-US" sz="2800" dirty="0" err="1"/>
+              <a:t>nat</a:t>
+            </a:r>
+            <a:endParaRPr lang="en-US" sz="2800" dirty="0"/>
+          </a:p>
+        </p:txBody>
+      </p:sp>
+      <p:sp>
+        <p:nvSpPr>
+          <p:cNvPr id="10" name="TextBox 9">
+            <a:extLst>
+              <a:ext uri="{FF2B5EF4-FFF2-40B4-BE49-F238E27FC236}">
+                <a16:creationId xmlns:a16="http://schemas.microsoft.com/office/drawing/2014/main" id="{00B73FD6-67C0-9F4F-B718-726D3FAA4C52}"/>
+              </a:ext>
+            </a:extLst>
+          </p:cNvPr>
+          <p:cNvSpPr txBox="1"/>
+          <p:nvPr/>
+        </p:nvSpPr>
+        <p:spPr>
+          <a:xfrm>
+            <a:off x="5905390" y="2490412"/>
+            <a:ext cx="872098" cy="523220"/>
+          </a:xfrm>
+          <a:prstGeom prst="rect">
+            <a:avLst/>
+          </a:prstGeom>
+          <a:noFill/>
+          <a:ln w="25400">
+            <a:solidFill>
+              <a:schemeClr val="accent1"/>
+            </a:solidFill>
+          </a:ln>
+        </p:spPr>
+        <p:txBody>
+          <a:bodyPr wrap="none" rtlCol="0">
+            <a:spAutoFit/>
+          </a:bodyPr>
+          <a:lstStyle/>
+          <a:p>
+            <a:r>
+              <a:rPr lang="en-US" sz="2800" dirty="0"/>
+              <a:t>Type</a:t>
+            </a:r>
+          </a:p>
+        </p:txBody>
+      </p:sp>
+      <p:sp>
+        <p:nvSpPr>
+          <p:cNvPr id="12" name="TextBox 11">
+            <a:extLst>
+              <a:ext uri="{FF2B5EF4-FFF2-40B4-BE49-F238E27FC236}">
+                <a16:creationId xmlns:a16="http://schemas.microsoft.com/office/drawing/2014/main" id="{4729C342-800D-9147-B74D-0D06487F1F1D}"/>
+              </a:ext>
+            </a:extLst>
+          </p:cNvPr>
+          <p:cNvSpPr txBox="1"/>
+          <p:nvPr/>
+        </p:nvSpPr>
+        <p:spPr>
+          <a:xfrm>
+            <a:off x="7106302" y="2490412"/>
+            <a:ext cx="1136593" cy="523220"/>
+          </a:xfrm>
+          <a:prstGeom prst="rect">
+            <a:avLst/>
+          </a:prstGeom>
+          <a:noFill/>
+          <a:ln w="25400">
+            <a:solidFill>
+              <a:schemeClr val="accent1"/>
+            </a:solidFill>
+          </a:ln>
+        </p:spPr>
+        <p:txBody>
+          <a:bodyPr wrap="none" rtlCol="0">
+            <a:spAutoFit/>
+          </a:bodyPr>
+          <a:lstStyle/>
+          <a:p>
+            <a:r>
+              <a:rPr lang="en-US" sz="2800" dirty="0"/>
+              <a:t>Type 1</a:t>
+            </a:r>
+          </a:p>
+        </p:txBody>
+      </p:sp>
+      <p:sp>
+        <p:nvSpPr>
+          <p:cNvPr id="13" name="TextBox 12">
+            <a:extLst>
+              <a:ext uri="{FF2B5EF4-FFF2-40B4-BE49-F238E27FC236}">
+                <a16:creationId xmlns:a16="http://schemas.microsoft.com/office/drawing/2014/main" id="{09E0358E-16DA-794A-ACDE-AC69E165F0FE}"/>
+              </a:ext>
+            </a:extLst>
+          </p:cNvPr>
+          <p:cNvSpPr txBox="1"/>
+          <p:nvPr/>
+        </p:nvSpPr>
+        <p:spPr>
+          <a:xfrm>
+            <a:off x="8571709" y="2498716"/>
+            <a:ext cx="1136593" cy="523220"/>
+          </a:xfrm>
+          <a:prstGeom prst="rect">
+            <a:avLst/>
+          </a:prstGeom>
+          <a:noFill/>
+          <a:ln w="25400">
+            <a:solidFill>
+              <a:schemeClr val="accent1"/>
+            </a:solidFill>
+          </a:ln>
+        </p:spPr>
+        <p:txBody>
+          <a:bodyPr wrap="none" rtlCol="0">
+            <a:spAutoFit/>
+          </a:bodyPr>
+          <a:lstStyle/>
+          <a:p>
+            <a:r>
+              <a:rPr lang="en-US" sz="2800" dirty="0"/>
+              <a:t>Type 2</a:t>
+            </a:r>
+          </a:p>
+        </p:txBody>
+      </p:sp>
+      <p:cxnSp>
+        <p:nvCxnSpPr>
+          <p:cNvPr id="15" name="Straight Arrow Connector 14">
+            <a:extLst>
+              <a:ext uri="{FF2B5EF4-FFF2-40B4-BE49-F238E27FC236}">
+                <a16:creationId xmlns:a16="http://schemas.microsoft.com/office/drawing/2014/main" id="{E49869E1-7FA8-5140-A61B-A5EF1B1D7ED5}"/>
+              </a:ext>
+            </a:extLst>
+          </p:cNvPr>
+          <p:cNvCxnSpPr>
+            <a:stCxn id="5" idx="3"/>
+            <a:endCxn id="6" idx="1"/>
+          </p:cNvCxnSpPr>
+          <p:nvPr/>
+        </p:nvCxnSpPr>
+        <p:spPr>
+          <a:xfrm flipV="1">
+            <a:off x="2381010" y="2122558"/>
+            <a:ext cx="570292" cy="14406"/>
+          </a:xfrm>
+          <a:prstGeom prst="straightConnector1">
+            <a:avLst/>
+          </a:prstGeom>
+          <a:ln w="25400">
+            <a:tailEnd type="triangle"/>
+          </a:ln>
+        </p:spPr>
+        <p:style>
+          <a:lnRef idx="1">
+            <a:schemeClr val="accent1"/>
+          </a:lnRef>
+          <a:fillRef idx="0">
+            <a:schemeClr val="accent1"/>
+          </a:fillRef>
+          <a:effectRef idx="0">
+            <a:schemeClr val="accent1"/>
+          </a:effectRef>
+          <a:fontRef idx="minor">
+            <a:schemeClr val="tx1"/>
+          </a:fontRef>
+        </p:style>
+      </p:cxnSp>
+      <p:cxnSp>
+        <p:nvCxnSpPr>
+          <p:cNvPr id="16" name="Straight Arrow Connector 15">
+            <a:extLst>
+              <a:ext uri="{FF2B5EF4-FFF2-40B4-BE49-F238E27FC236}">
+                <a16:creationId xmlns:a16="http://schemas.microsoft.com/office/drawing/2014/main" id="{1FD393E2-0A67-944C-83EC-ADC0F8FC58A5}"/>
+              </a:ext>
+            </a:extLst>
+          </p:cNvPr>
+          <p:cNvCxnSpPr>
+            <a:cxnSpLocks/>
+            <a:stCxn id="6" idx="3"/>
+            <a:endCxn id="7" idx="1"/>
+          </p:cNvCxnSpPr>
+          <p:nvPr/>
+        </p:nvCxnSpPr>
+        <p:spPr>
+          <a:xfrm>
+            <a:off x="3844495" y="2122558"/>
+            <a:ext cx="591140" cy="0"/>
+          </a:xfrm>
+          <a:prstGeom prst="straightConnector1">
+            <a:avLst/>
+          </a:prstGeom>
+          <a:ln w="25400">
+            <a:tailEnd type="triangle"/>
+          </a:ln>
+        </p:spPr>
+        <p:style>
+          <a:lnRef idx="1">
+            <a:schemeClr val="accent1"/>
+          </a:lnRef>
+          <a:fillRef idx="0">
+            <a:schemeClr val="accent1"/>
+          </a:fillRef>
+          <a:effectRef idx="0">
+            <a:schemeClr val="accent1"/>
+          </a:effectRef>
+          <a:fontRef idx="minor">
+            <a:schemeClr val="tx1"/>
+          </a:fontRef>
+        </p:style>
+      </p:cxnSp>
+      <p:cxnSp>
+        <p:nvCxnSpPr>
+          <p:cNvPr id="20" name="Straight Arrow Connector 19">
+            <a:extLst>
+              <a:ext uri="{FF2B5EF4-FFF2-40B4-BE49-F238E27FC236}">
+                <a16:creationId xmlns:a16="http://schemas.microsoft.com/office/drawing/2014/main" id="{F8A2AEE4-DF13-EF45-BA8D-20719E6A135E}"/>
+              </a:ext>
+            </a:extLst>
+          </p:cNvPr>
+          <p:cNvCxnSpPr>
+            <a:cxnSpLocks/>
+            <a:stCxn id="8" idx="3"/>
+            <a:endCxn id="9" idx="1"/>
+          </p:cNvCxnSpPr>
+          <p:nvPr/>
+        </p:nvCxnSpPr>
+        <p:spPr>
+          <a:xfrm>
+            <a:off x="3844495" y="3277445"/>
+            <a:ext cx="790966" cy="0"/>
+          </a:xfrm>
+          <a:prstGeom prst="straightConnector1">
+            <a:avLst/>
+          </a:prstGeom>
+          <a:ln w="25400">
+            <a:tailEnd type="triangle"/>
+          </a:ln>
+        </p:spPr>
+        <p:style>
+          <a:lnRef idx="1">
+            <a:schemeClr val="accent1"/>
+          </a:lnRef>
+          <a:fillRef idx="0">
+            <a:schemeClr val="accent1"/>
+          </a:fillRef>
+          <a:effectRef idx="0">
+            <a:schemeClr val="accent1"/>
+          </a:effectRef>
+          <a:fontRef idx="minor">
+            <a:schemeClr val="tx1"/>
+          </a:fontRef>
+        </p:style>
+      </p:cxnSp>
+      <p:cxnSp>
+        <p:nvCxnSpPr>
+          <p:cNvPr id="23" name="Straight Arrow Connector 22">
+            <a:extLst>
+              <a:ext uri="{FF2B5EF4-FFF2-40B4-BE49-F238E27FC236}">
+                <a16:creationId xmlns:a16="http://schemas.microsoft.com/office/drawing/2014/main" id="{7619EBD3-766A-E448-8448-1E46CF5B2A5D}"/>
+              </a:ext>
+            </a:extLst>
+          </p:cNvPr>
+          <p:cNvCxnSpPr>
+            <a:cxnSpLocks/>
+            <a:stCxn id="7" idx="3"/>
+            <a:endCxn id="10" idx="1"/>
+          </p:cNvCxnSpPr>
+          <p:nvPr/>
+        </p:nvCxnSpPr>
+        <p:spPr>
+          <a:xfrm>
+            <a:off x="5303821" y="2122558"/>
+            <a:ext cx="601569" cy="629464"/>
+          </a:xfrm>
+          <a:prstGeom prst="straightConnector1">
+            <a:avLst/>
+          </a:prstGeom>
+          <a:ln w="25400">
+            <a:tailEnd type="triangle"/>
+          </a:ln>
+        </p:spPr>
+        <p:style>
+          <a:lnRef idx="1">
+            <a:schemeClr val="accent1"/>
+          </a:lnRef>
+          <a:fillRef idx="0">
+            <a:schemeClr val="accent1"/>
+          </a:fillRef>
+          <a:effectRef idx="0">
+            <a:schemeClr val="accent1"/>
+          </a:effectRef>
+          <a:fontRef idx="minor">
+            <a:schemeClr val="tx1"/>
+          </a:fontRef>
+        </p:style>
+      </p:cxnSp>
+      <p:cxnSp>
+        <p:nvCxnSpPr>
+          <p:cNvPr id="26" name="Straight Arrow Connector 25">
+            <a:extLst>
+              <a:ext uri="{FF2B5EF4-FFF2-40B4-BE49-F238E27FC236}">
+                <a16:creationId xmlns:a16="http://schemas.microsoft.com/office/drawing/2014/main" id="{C9F86CF3-5498-0246-B5D4-0F382E2B591A}"/>
+              </a:ext>
+            </a:extLst>
+          </p:cNvPr>
+          <p:cNvCxnSpPr>
+            <a:cxnSpLocks/>
+            <a:stCxn id="9" idx="3"/>
+            <a:endCxn id="10" idx="1"/>
+          </p:cNvCxnSpPr>
+          <p:nvPr/>
+        </p:nvCxnSpPr>
+        <p:spPr>
+          <a:xfrm flipV="1">
+            <a:off x="5297694" y="2752022"/>
+            <a:ext cx="607696" cy="525423"/>
+          </a:xfrm>
+          <a:prstGeom prst="straightConnector1">
+            <a:avLst/>
+          </a:prstGeom>
+          <a:ln w="25400">
+            <a:tailEnd type="triangle"/>
+          </a:ln>
+        </p:spPr>
+        <p:style>
+          <a:lnRef idx="1">
+            <a:schemeClr val="accent1"/>
+          </a:lnRef>
+          <a:fillRef idx="0">
+            <a:schemeClr val="accent1"/>
+          </a:fillRef>
+          <a:effectRef idx="0">
+            <a:schemeClr val="accent1"/>
+          </a:effectRef>
+          <a:fontRef idx="minor">
+            <a:schemeClr val="tx1"/>
+          </a:fontRef>
+        </p:style>
+      </p:cxnSp>
+      <p:cxnSp>
+        <p:nvCxnSpPr>
+          <p:cNvPr id="29" name="Straight Arrow Connector 28">
+            <a:extLst>
+              <a:ext uri="{FF2B5EF4-FFF2-40B4-BE49-F238E27FC236}">
+                <a16:creationId xmlns:a16="http://schemas.microsoft.com/office/drawing/2014/main" id="{963F11D9-5985-554E-B33F-02B3A0E954ED}"/>
+              </a:ext>
+            </a:extLst>
+          </p:cNvPr>
+          <p:cNvCxnSpPr>
+            <a:cxnSpLocks/>
+            <a:stCxn id="10" idx="3"/>
+            <a:endCxn id="12" idx="1"/>
+          </p:cNvCxnSpPr>
+          <p:nvPr/>
+        </p:nvCxnSpPr>
+        <p:spPr>
+          <a:xfrm>
+            <a:off x="6777488" y="2752022"/>
+            <a:ext cx="328814" cy="0"/>
+          </a:xfrm>
+          <a:prstGeom prst="straightConnector1">
+            <a:avLst/>
+          </a:prstGeom>
+          <a:ln w="25400">
+            <a:tailEnd type="triangle"/>
+          </a:ln>
+        </p:spPr>
+        <p:style>
+          <a:lnRef idx="1">
+            <a:schemeClr val="accent1"/>
+          </a:lnRef>
+          <a:fillRef idx="0">
+            <a:schemeClr val="accent1"/>
+          </a:fillRef>
+          <a:effectRef idx="0">
+            <a:schemeClr val="accent1"/>
+          </a:effectRef>
+          <a:fontRef idx="minor">
+            <a:schemeClr val="tx1"/>
+          </a:fontRef>
+        </p:style>
+      </p:cxnSp>
+      <p:cxnSp>
+        <p:nvCxnSpPr>
+          <p:cNvPr id="32" name="Straight Arrow Connector 31">
+            <a:extLst>
+              <a:ext uri="{FF2B5EF4-FFF2-40B4-BE49-F238E27FC236}">
+                <a16:creationId xmlns:a16="http://schemas.microsoft.com/office/drawing/2014/main" id="{E0B0E193-D4DA-124F-AAC7-9C4D7E94CFDF}"/>
+              </a:ext>
+            </a:extLst>
+          </p:cNvPr>
+          <p:cNvCxnSpPr>
+            <a:cxnSpLocks/>
+            <a:stCxn id="12" idx="3"/>
+            <a:endCxn id="13" idx="1"/>
+          </p:cNvCxnSpPr>
+          <p:nvPr/>
+        </p:nvCxnSpPr>
+        <p:spPr>
+          <a:xfrm>
+            <a:off x="8242895" y="2752022"/>
+            <a:ext cx="328814" cy="8304"/>
+          </a:xfrm>
+          <a:prstGeom prst="straightConnector1">
+            <a:avLst/>
+          </a:prstGeom>
+          <a:ln w="25400">
+            <a:tailEnd type="triangle"/>
+          </a:ln>
+        </p:spPr>
+        <p:style>
+          <a:lnRef idx="1">
+            <a:schemeClr val="accent1"/>
+          </a:lnRef>
+          <a:fillRef idx="0">
+            <a:schemeClr val="accent1"/>
+          </a:fillRef>
+          <a:effectRef idx="0">
+            <a:schemeClr val="accent1"/>
+          </a:effectRef>
+          <a:fontRef idx="minor">
+            <a:schemeClr val="tx1"/>
+          </a:fontRef>
+        </p:style>
+      </p:cxnSp>
+      <p:sp>
+        <p:nvSpPr>
+          <p:cNvPr id="35" name="TextBox 34">
+            <a:extLst>
+              <a:ext uri="{FF2B5EF4-FFF2-40B4-BE49-F238E27FC236}">
+                <a16:creationId xmlns:a16="http://schemas.microsoft.com/office/drawing/2014/main" id="{FA8DAA45-2DC6-8840-88E5-2AF863AD7C09}"/>
+              </a:ext>
+            </a:extLst>
+          </p:cNvPr>
+          <p:cNvSpPr txBox="1"/>
+          <p:nvPr/>
+        </p:nvSpPr>
+        <p:spPr>
+          <a:xfrm>
+            <a:off x="2063262" y="1568560"/>
+            <a:ext cx="1184940" cy="369332"/>
+          </a:xfrm>
+          <a:prstGeom prst="rect">
+            <a:avLst/>
+          </a:prstGeom>
+          <a:noFill/>
+        </p:spPr>
+        <p:txBody>
+          <a:bodyPr wrap="none" rtlCol="0">
+            <a:spAutoFit/>
+          </a:bodyPr>
+          <a:lstStyle/>
+          <a:p>
+            <a:r>
+              <a:rPr lang="en-US" dirty="0"/>
+              <a:t>(is of type)</a:t>
+            </a:r>
+          </a:p>
+        </p:txBody>
+      </p:sp>
+      <p:sp>
+        <p:nvSpPr>
+          <p:cNvPr id="36" name="TextBox 35">
+            <a:extLst>
+              <a:ext uri="{FF2B5EF4-FFF2-40B4-BE49-F238E27FC236}">
+                <a16:creationId xmlns:a16="http://schemas.microsoft.com/office/drawing/2014/main" id="{FE10F96F-FFCA-A24D-93BE-52845A253E29}"/>
+              </a:ext>
+            </a:extLst>
+          </p:cNvPr>
+          <p:cNvSpPr txBox="1"/>
+          <p:nvPr/>
+        </p:nvSpPr>
+        <p:spPr>
+          <a:xfrm>
+            <a:off x="3547595" y="1568560"/>
+            <a:ext cx="1184940" cy="369332"/>
+          </a:xfrm>
+          <a:prstGeom prst="rect">
+            <a:avLst/>
+          </a:prstGeom>
+          <a:noFill/>
+        </p:spPr>
+        <p:txBody>
+          <a:bodyPr wrap="none" rtlCol="0">
+            <a:spAutoFit/>
+          </a:bodyPr>
+          <a:lstStyle/>
+          <a:p>
+            <a:r>
+              <a:rPr lang="en-US" dirty="0"/>
+              <a:t>(is of type)</a:t>
+            </a:r>
+          </a:p>
+        </p:txBody>
+      </p:sp>
+      <p:cxnSp>
+        <p:nvCxnSpPr>
+          <p:cNvPr id="37" name="Straight Arrow Connector 36">
+            <a:extLst>
+              <a:ext uri="{FF2B5EF4-FFF2-40B4-BE49-F238E27FC236}">
+                <a16:creationId xmlns:a16="http://schemas.microsoft.com/office/drawing/2014/main" id="{5EAA5473-2540-5B4F-B924-F3A68D24EBC6}"/>
+              </a:ext>
+            </a:extLst>
+          </p:cNvPr>
+          <p:cNvCxnSpPr>
+            <a:cxnSpLocks/>
+          </p:cNvCxnSpPr>
+          <p:nvPr/>
+        </p:nvCxnSpPr>
+        <p:spPr>
+          <a:xfrm>
+            <a:off x="9699210" y="2760326"/>
+            <a:ext cx="328814" cy="8304"/>
+          </a:xfrm>
+          <a:prstGeom prst="straightConnector1">
+            <a:avLst/>
+          </a:prstGeom>
+          <a:ln w="25400">
+            <a:tailEnd type="triangle"/>
+          </a:ln>
+        </p:spPr>
+        <p:style>
+          <a:lnRef idx="1">
+            <a:schemeClr val="accent1"/>
+          </a:lnRef>
+          <a:fillRef idx="0">
+            <a:schemeClr val="accent1"/>
+          </a:fillRef>
+          <a:effectRef idx="0">
+            <a:schemeClr val="accent1"/>
+          </a:effectRef>
+          <a:fontRef idx="minor">
+            <a:schemeClr val="tx1"/>
+          </a:fontRef>
+        </p:style>
+      </p:cxnSp>
+      <p:sp>
+        <p:nvSpPr>
+          <p:cNvPr id="38" name="TextBox 37">
+            <a:extLst>
+              <a:ext uri="{FF2B5EF4-FFF2-40B4-BE49-F238E27FC236}">
+                <a16:creationId xmlns:a16="http://schemas.microsoft.com/office/drawing/2014/main" id="{FB7EF9E1-BC03-7B41-A51F-FB3489932E21}"/>
+              </a:ext>
+            </a:extLst>
+          </p:cNvPr>
+          <p:cNvSpPr txBox="1"/>
+          <p:nvPr/>
+        </p:nvSpPr>
+        <p:spPr>
+          <a:xfrm>
+            <a:off x="10024924" y="2516852"/>
+            <a:ext cx="343364" cy="369332"/>
+          </a:xfrm>
+          <a:prstGeom prst="rect">
+            <a:avLst/>
+          </a:prstGeom>
+          <a:noFill/>
+        </p:spPr>
+        <p:txBody>
+          <a:bodyPr wrap="none" rtlCol="0">
+            <a:spAutoFit/>
+          </a:bodyPr>
+          <a:lstStyle/>
+          <a:p>
+            <a:r>
+              <a:rPr lang="en-US" dirty="0"/>
+              <a:t>…</a:t>
+            </a:r>
+          </a:p>
+        </p:txBody>
+      </p:sp>
+      <p:sp>
+        <p:nvSpPr>
+          <p:cNvPr id="39" name="TextBox 38">
+            <a:extLst>
+              <a:ext uri="{FF2B5EF4-FFF2-40B4-BE49-F238E27FC236}">
+                <a16:creationId xmlns:a16="http://schemas.microsoft.com/office/drawing/2014/main" id="{E4BEBDC6-09DA-7145-8083-767D0474D068}"/>
+              </a:ext>
+            </a:extLst>
+          </p:cNvPr>
+          <p:cNvSpPr txBox="1"/>
+          <p:nvPr/>
+        </p:nvSpPr>
+        <p:spPr>
+          <a:xfrm>
+            <a:off x="2159861" y="2362964"/>
+            <a:ext cx="925253" cy="338554"/>
+          </a:xfrm>
+          <a:prstGeom prst="rect">
+            <a:avLst/>
+          </a:prstGeom>
+          <a:noFill/>
+        </p:spPr>
+        <p:txBody>
+          <a:bodyPr wrap="none" rtlCol="0">
+            <a:spAutoFit/>
+          </a:bodyPr>
+          <a:lstStyle/>
+          <a:p>
+            <a:r>
+              <a:rPr lang="en-US" sz="1600" dirty="0">
+                <a:latin typeface="Courier New" panose="02070309020205020404" pitchFamily="49" charset="0"/>
+                <a:cs typeface="Courier New" panose="02070309020205020404" pitchFamily="49" charset="0"/>
+              </a:rPr>
+              <a:t>#check</a:t>
+            </a:r>
+          </a:p>
+        </p:txBody>
+      </p:sp>
+    </p:spTree>
+    <p:extLst>
+      <p:ext uri="{BB962C8B-B14F-4D97-AF65-F5344CB8AC3E}">
+        <p14:creationId xmlns:p14="http://schemas.microsoft.com/office/powerpoint/2010/main" val="2961555069"/>
+      </p:ext>
+    </p:extLst>
+  </p:cSld>
+  <p:clrMapOvr>
+    <a:masterClrMapping/>
+  </p:clrMapOvr>
+</p:sld>
+</file>
+
+<file path=ppt/slides/slide21.xml><?xml version="1.0" encoding="utf-8"?>
 <p:sld xmlns:a="http://schemas.openxmlformats.org/drawingml/2006/main" xmlns:r="http://schemas.openxmlformats.org/officeDocument/2006/relationships" xmlns:p="http://schemas.openxmlformats.org/presentationml/2006/main">
   <p:cSld>
     <p:bg>
@@ -4870,7 +7244,487 @@
 </p:sld>
 </file>
 
-<file path=ppt/slides/slide14.xml><?xml version="1.0" encoding="utf-8"?>
+<file path=ppt/slides/slide22.xml><?xml version="1.0" encoding="utf-8"?>
+<p:sld xmlns:a="http://schemas.openxmlformats.org/drawingml/2006/main" xmlns:r="http://schemas.openxmlformats.org/officeDocument/2006/relationships" xmlns:p="http://schemas.openxmlformats.org/presentationml/2006/main">
+  <p:cSld>
+    <p:spTree>
+      <p:nvGrpSpPr>
+        <p:cNvPr id="1" name=""/>
+        <p:cNvGrpSpPr/>
+        <p:nvPr/>
+      </p:nvGrpSpPr>
+      <p:grpSpPr>
+        <a:xfrm>
+          <a:off x="0" y="0"/>
+          <a:ext cx="0" cy="0"/>
+          <a:chOff x="0" y="0"/>
+          <a:chExt cx="0" cy="0"/>
+        </a:xfrm>
+      </p:grpSpPr>
+      <p:sp>
+        <p:nvSpPr>
+          <p:cNvPr id="2" name="Title 1">
+            <a:extLst>
+              <a:ext uri="{FF2B5EF4-FFF2-40B4-BE49-F238E27FC236}">
+                <a16:creationId xmlns:a16="http://schemas.microsoft.com/office/drawing/2014/main" id="{814929BF-E7B3-3643-AE6A-B06C2617131F}"/>
+              </a:ext>
+            </a:extLst>
+          </p:cNvPr>
+          <p:cNvSpPr>
+            <a:spLocks noGrp="1"/>
+          </p:cNvSpPr>
+          <p:nvPr>
+            <p:ph type="title"/>
+          </p:nvPr>
+        </p:nvSpPr>
+        <p:spPr/>
+        <p:txBody>
+          <a:bodyPr/>
+          <a:lstStyle/>
+          <a:p>
+            <a:r>
+              <a:rPr lang="en-US" dirty="0"/>
+              <a:t>Tactics/Strategies</a:t>
+            </a:r>
+          </a:p>
+        </p:txBody>
+      </p:sp>
+      <p:sp>
+        <p:nvSpPr>
+          <p:cNvPr id="3" name="Content Placeholder 2">
+            <a:extLst>
+              <a:ext uri="{FF2B5EF4-FFF2-40B4-BE49-F238E27FC236}">
+                <a16:creationId xmlns:a16="http://schemas.microsoft.com/office/drawing/2014/main" id="{C94B3ADD-E6BF-B045-B860-25C7A79F8A25}"/>
+              </a:ext>
+            </a:extLst>
+          </p:cNvPr>
+          <p:cNvSpPr>
+            <a:spLocks noGrp="1"/>
+          </p:cNvSpPr>
+          <p:nvPr>
+            <p:ph idx="1"/>
+          </p:nvPr>
+        </p:nvSpPr>
+        <p:spPr/>
+        <p:txBody>
+          <a:bodyPr/>
+          <a:lstStyle/>
+          <a:p>
+            <a:r>
+              <a:rPr lang="en-US" dirty="0"/>
+              <a:t>The inference rule </a:t>
+            </a:r>
+            <a:r>
+              <a:rPr lang="en-US" sz="2400" dirty="0" err="1">
+                <a:latin typeface="Courier New" panose="02070309020205020404" pitchFamily="49" charset="0"/>
+                <a:cs typeface="Courier New" panose="02070309020205020404" pitchFamily="49" charset="0"/>
+              </a:rPr>
+              <a:t>eq.refl</a:t>
+            </a:r>
+            <a:r>
+              <a:rPr lang="en-US" dirty="0"/>
+              <a:t> is very simple — it takes a single argument, e.g. </a:t>
+            </a:r>
+            <a:r>
+              <a:rPr lang="en-US" dirty="0">
+                <a:latin typeface="Courier New" panose="02070309020205020404" pitchFamily="49" charset="0"/>
+                <a:cs typeface="Courier New" panose="02070309020205020404" pitchFamily="49" charset="0"/>
+              </a:rPr>
+              <a:t>0</a:t>
+            </a:r>
+            <a:r>
+              <a:rPr lang="en-US" dirty="0"/>
+              <a:t>, and creates a proof of a proposition that the argument equals itself, e.g., </a:t>
+            </a:r>
+            <a:r>
+              <a:rPr lang="en-US" sz="2400" dirty="0">
+                <a:latin typeface="Courier New" panose="02070309020205020404" pitchFamily="49" charset="0"/>
+                <a:cs typeface="Courier New" panose="02070309020205020404" pitchFamily="49" charset="0"/>
+              </a:rPr>
+              <a:t>0 = 0</a:t>
+            </a:r>
+            <a:endParaRPr lang="en-US" dirty="0">
+              <a:latin typeface="Courier New" panose="02070309020205020404" pitchFamily="49" charset="0"/>
+              <a:cs typeface="Courier New" panose="02070309020205020404" pitchFamily="49" charset="0"/>
+            </a:endParaRPr>
+          </a:p>
+          <a:p>
+            <a:r>
+              <a:rPr lang="en-US" dirty="0"/>
+              <a:t>The tactic </a:t>
+            </a:r>
+            <a:r>
+              <a:rPr lang="en-US" sz="2400" dirty="0" err="1">
+                <a:latin typeface="Courier New" panose="02070309020205020404" pitchFamily="49" charset="0"/>
+                <a:cs typeface="Courier New" panose="02070309020205020404" pitchFamily="49" charset="0"/>
+              </a:rPr>
+              <a:t>rfl</a:t>
+            </a:r>
+            <a:r>
+              <a:rPr lang="en-US" dirty="0"/>
+              <a:t> might seem simpler because it takes no argument, but because it must infer not just the </a:t>
+            </a:r>
+            <a:r>
+              <a:rPr lang="en-US" i="1" dirty="0"/>
+              <a:t>type</a:t>
+            </a:r>
+            <a:r>
+              <a:rPr lang="en-US" dirty="0"/>
+              <a:t> but also the </a:t>
+            </a:r>
+            <a:r>
+              <a:rPr lang="en-US" i="1" dirty="0"/>
+              <a:t>value</a:t>
+            </a:r>
+            <a:r>
+              <a:rPr lang="en-US" dirty="0"/>
+              <a:t> to use for the proposition, the tactic’s logic is more complicated</a:t>
+            </a:r>
+          </a:p>
+          <a:p>
+            <a:r>
+              <a:rPr lang="en-US" dirty="0"/>
+              <a:t>Building up more complicated rules from simpler rules is common in provers</a:t>
+            </a:r>
+          </a:p>
+          <a:p>
+            <a:pPr lvl="1"/>
+            <a:r>
+              <a:rPr lang="en-US" dirty="0"/>
+              <a:t>In some provers (e.g., Lean) these are called </a:t>
+            </a:r>
+            <a:r>
+              <a:rPr lang="en-US" i="1" dirty="0"/>
+              <a:t>tactics</a:t>
+            </a:r>
+            <a:r>
+              <a:rPr lang="en-US" dirty="0"/>
+              <a:t>, and in other provers (e.g., PVS) these are call </a:t>
+            </a:r>
+            <a:r>
+              <a:rPr lang="en-US" i="1" dirty="0"/>
+              <a:t>strategies</a:t>
+            </a:r>
+            <a:r>
+              <a:rPr lang="en-US" dirty="0"/>
+              <a:t>, but the idea is the same across provers</a:t>
+            </a:r>
+          </a:p>
+        </p:txBody>
+      </p:sp>
+    </p:spTree>
+    <p:extLst>
+      <p:ext uri="{BB962C8B-B14F-4D97-AF65-F5344CB8AC3E}">
+        <p14:creationId xmlns:p14="http://schemas.microsoft.com/office/powerpoint/2010/main" val="4221753708"/>
+      </p:ext>
+    </p:extLst>
+  </p:cSld>
+  <p:clrMapOvr>
+    <a:masterClrMapping/>
+  </p:clrMapOvr>
+</p:sld>
+</file>
+
+<file path=ppt/slides/slide23.xml><?xml version="1.0" encoding="utf-8"?>
+<p:sld xmlns:a="http://schemas.openxmlformats.org/drawingml/2006/main" xmlns:r="http://schemas.openxmlformats.org/officeDocument/2006/relationships" xmlns:p="http://schemas.openxmlformats.org/presentationml/2006/main">
+  <p:cSld>
+    <p:spTree>
+      <p:nvGrpSpPr>
+        <p:cNvPr id="1" name=""/>
+        <p:cNvGrpSpPr/>
+        <p:nvPr/>
+      </p:nvGrpSpPr>
+      <p:grpSpPr>
+        <a:xfrm>
+          <a:off x="0" y="0"/>
+          <a:ext cx="0" cy="0"/>
+          <a:chOff x="0" y="0"/>
+          <a:chExt cx="0" cy="0"/>
+        </a:xfrm>
+      </p:grpSpPr>
+      <p:sp>
+        <p:nvSpPr>
+          <p:cNvPr id="2" name="Title 1">
+            <a:extLst>
+              <a:ext uri="{FF2B5EF4-FFF2-40B4-BE49-F238E27FC236}">
+                <a16:creationId xmlns:a16="http://schemas.microsoft.com/office/drawing/2014/main" id="{164B6972-7164-1E45-8D52-A5B4A0033D48}"/>
+              </a:ext>
+            </a:extLst>
+          </p:cNvPr>
+          <p:cNvSpPr>
+            <a:spLocks noGrp="1"/>
+          </p:cNvSpPr>
+          <p:nvPr>
+            <p:ph type="title"/>
+          </p:nvPr>
+        </p:nvSpPr>
+        <p:spPr/>
+        <p:txBody>
+          <a:bodyPr/>
+          <a:lstStyle/>
+          <a:p>
+            <a:r>
+              <a:rPr lang="en-US" dirty="0"/>
+              <a:t>Reduction in Lean</a:t>
+            </a:r>
+          </a:p>
+        </p:txBody>
+      </p:sp>
+      <p:sp>
+        <p:nvSpPr>
+          <p:cNvPr id="3" name="Content Placeholder 2">
+            <a:extLst>
+              <a:ext uri="{FF2B5EF4-FFF2-40B4-BE49-F238E27FC236}">
+                <a16:creationId xmlns:a16="http://schemas.microsoft.com/office/drawing/2014/main" id="{C3685CD9-2992-0946-8432-9BC0400AAD65}"/>
+              </a:ext>
+            </a:extLst>
+          </p:cNvPr>
+          <p:cNvSpPr>
+            <a:spLocks noGrp="1"/>
+          </p:cNvSpPr>
+          <p:nvPr>
+            <p:ph idx="1"/>
+          </p:nvPr>
+        </p:nvSpPr>
+        <p:spPr/>
+        <p:txBody>
+          <a:bodyPr/>
+          <a:lstStyle/>
+          <a:p>
+            <a:r>
+              <a:rPr lang="en-US" dirty="0"/>
+              <a:t>Another useful feature of Lean is its ability to automatically </a:t>
+            </a:r>
+            <a:r>
+              <a:rPr lang="en-US" i="1" dirty="0"/>
+              <a:t>reduce</a:t>
+            </a:r>
+            <a:r>
+              <a:rPr lang="en-US" dirty="0"/>
+              <a:t> simple arithmetic examples</a:t>
+            </a:r>
+          </a:p>
+          <a:p>
+            <a:pPr lvl="1"/>
+            <a:r>
+              <a:rPr lang="en-US" dirty="0"/>
+              <a:t>Use #reduce to see how Lean will reduce</a:t>
+            </a:r>
+          </a:p>
+          <a:p>
+            <a:pPr lvl="1"/>
+            <a:r>
+              <a:rPr lang="en-US" dirty="0"/>
+              <a:t>This is useful for proofs, e.g., when proving that 2 = 1 + 1:</a:t>
+            </a:r>
+            <a:br>
+              <a:rPr lang="en-US" dirty="0"/>
+            </a:br>
+            <a:r>
+              <a:rPr lang="en-US" sz="2000" dirty="0">
+                <a:latin typeface="Courier New" panose="02070309020205020404" pitchFamily="49" charset="0"/>
+                <a:cs typeface="Courier New" panose="02070309020205020404" pitchFamily="49" charset="0"/>
+              </a:rPr>
+              <a:t>theorem t1 : 2 = 1 + 1 := </a:t>
+            </a:r>
+            <a:r>
+              <a:rPr lang="en-US" sz="2000" dirty="0" err="1">
+                <a:latin typeface="Courier New" panose="02070309020205020404" pitchFamily="49" charset="0"/>
+                <a:cs typeface="Courier New" panose="02070309020205020404" pitchFamily="49" charset="0"/>
+              </a:rPr>
+              <a:t>rfl</a:t>
+            </a:r>
+            <a:endParaRPr lang="en-US" sz="2000" dirty="0">
+              <a:latin typeface="Courier New" panose="02070309020205020404" pitchFamily="49" charset="0"/>
+              <a:cs typeface="Courier New" panose="02070309020205020404" pitchFamily="49" charset="0"/>
+            </a:endParaRPr>
+          </a:p>
+          <a:p>
+            <a:pPr lvl="1"/>
+            <a:r>
+              <a:rPr lang="en-US" dirty="0"/>
+              <a:t>Lean can </a:t>
+            </a:r>
+            <a:r>
+              <a:rPr lang="en-US" i="1" dirty="0"/>
+              <a:t>reduce</a:t>
+            </a:r>
+            <a:r>
+              <a:rPr lang="en-US" dirty="0"/>
+              <a:t> 1+1 to 2 and then use </a:t>
+            </a:r>
+            <a:r>
+              <a:rPr lang="en-US" dirty="0" err="1"/>
+              <a:t>rfl</a:t>
+            </a:r>
+            <a:r>
+              <a:rPr lang="en-US" dirty="0"/>
+              <a:t> to prove 2 = 2.</a:t>
+            </a:r>
+          </a:p>
+        </p:txBody>
+      </p:sp>
+    </p:spTree>
+    <p:extLst>
+      <p:ext uri="{BB962C8B-B14F-4D97-AF65-F5344CB8AC3E}">
+        <p14:creationId xmlns:p14="http://schemas.microsoft.com/office/powerpoint/2010/main" val="2183401280"/>
+      </p:ext>
+    </p:extLst>
+  </p:cSld>
+  <p:clrMapOvr>
+    <a:masterClrMapping/>
+  </p:clrMapOvr>
+</p:sld>
+</file>
+
+<file path=ppt/slides/slide24.xml><?xml version="1.0" encoding="utf-8"?>
+<p:sld xmlns:a="http://schemas.openxmlformats.org/drawingml/2006/main" xmlns:r="http://schemas.openxmlformats.org/officeDocument/2006/relationships" xmlns:p="http://schemas.openxmlformats.org/presentationml/2006/main">
+  <p:cSld>
+    <p:spTree>
+      <p:nvGrpSpPr>
+        <p:cNvPr id="1" name=""/>
+        <p:cNvGrpSpPr/>
+        <p:nvPr/>
+      </p:nvGrpSpPr>
+      <p:grpSpPr>
+        <a:xfrm>
+          <a:off x="0" y="0"/>
+          <a:ext cx="0" cy="0"/>
+          <a:chOff x="0" y="0"/>
+          <a:chExt cx="0" cy="0"/>
+        </a:xfrm>
+      </p:grpSpPr>
+      <p:sp>
+        <p:nvSpPr>
+          <p:cNvPr id="2" name="Title 1">
+            <a:extLst>
+              <a:ext uri="{FF2B5EF4-FFF2-40B4-BE49-F238E27FC236}">
+                <a16:creationId xmlns:a16="http://schemas.microsoft.com/office/drawing/2014/main" id="{6129D925-CB8E-DF4D-8A64-F6EDAE023F35}"/>
+              </a:ext>
+            </a:extLst>
+          </p:cNvPr>
+          <p:cNvSpPr>
+            <a:spLocks noGrp="1"/>
+          </p:cNvSpPr>
+          <p:nvPr>
+            <p:ph type="title"/>
+          </p:nvPr>
+        </p:nvSpPr>
+        <p:spPr/>
+        <p:txBody>
+          <a:bodyPr/>
+          <a:lstStyle/>
+          <a:p>
+            <a:r>
+              <a:rPr lang="en-US" dirty="0"/>
+              <a:t>Exercises</a:t>
+            </a:r>
+          </a:p>
+        </p:txBody>
+      </p:sp>
+      <p:sp>
+        <p:nvSpPr>
+          <p:cNvPr id="3" name="Content Placeholder 2">
+            <a:extLst>
+              <a:ext uri="{FF2B5EF4-FFF2-40B4-BE49-F238E27FC236}">
+                <a16:creationId xmlns:a16="http://schemas.microsoft.com/office/drawing/2014/main" id="{439CF21C-7BBD-634A-AD75-976C6B7827FF}"/>
+              </a:ext>
+            </a:extLst>
+          </p:cNvPr>
+          <p:cNvSpPr>
+            <a:spLocks noGrp="1"/>
+          </p:cNvSpPr>
+          <p:nvPr>
+            <p:ph idx="1"/>
+          </p:nvPr>
+        </p:nvSpPr>
+        <p:spPr/>
+        <p:txBody>
+          <a:bodyPr/>
+          <a:lstStyle/>
+          <a:p>
+            <a:r>
+              <a:rPr lang="en-US" dirty="0"/>
+              <a:t>Use </a:t>
+            </a:r>
+            <a:r>
+              <a:rPr lang="en-US" dirty="0" err="1"/>
+              <a:t>rfl</a:t>
+            </a:r>
+            <a:r>
+              <a:rPr lang="en-US" dirty="0"/>
+              <a:t> to produce a proof, h, of the proposition, "Hello" = "He" ++ "</a:t>
+            </a:r>
+            <a:r>
+              <a:rPr lang="en-US" dirty="0" err="1"/>
+              <a:t>llo</a:t>
+            </a:r>
+            <a:r>
+              <a:rPr lang="en-US" dirty="0"/>
+              <a:t>".</a:t>
+            </a:r>
+          </a:p>
+          <a:p>
+            <a:r>
+              <a:rPr lang="en-US" dirty="0"/>
+              <a:t>Use </a:t>
+            </a:r>
+            <a:r>
+              <a:rPr lang="en-US" dirty="0" err="1"/>
+              <a:t>rfl</a:t>
+            </a:r>
+            <a:r>
+              <a:rPr lang="en-US" dirty="0"/>
+              <a:t> to prove p: 3*3+4*4=5*5.</a:t>
+            </a:r>
+          </a:p>
+          <a:p>
+            <a:r>
+              <a:rPr lang="en-US" dirty="0"/>
+              <a:t>Prove as a theorem, </a:t>
+            </a:r>
+            <a:r>
+              <a:rPr lang="en-US" dirty="0" err="1"/>
+              <a:t>tthof</a:t>
+            </a:r>
+            <a:r>
+              <a:rPr lang="en-US" dirty="0"/>
+              <a:t> (a silly and uninformative name to be sure), that 2 + 3 = 1 + 4.</a:t>
+            </a:r>
+          </a:p>
+          <a:p>
+            <a:r>
+              <a:rPr lang="en-US" dirty="0"/>
+              <a:t>Prove as a theorem, </a:t>
+            </a:r>
+            <a:r>
+              <a:rPr lang="en-US" dirty="0" err="1"/>
+              <a:t>hpleqhl</a:t>
+            </a:r>
+            <a:r>
+              <a:rPr lang="en-US" dirty="0"/>
+              <a:t>, that "Hello " ++ "Lean! is equal to "Hello Lean!"</a:t>
+            </a:r>
+          </a:p>
+          <a:p>
+            <a:endParaRPr lang="en-US" dirty="0"/>
+          </a:p>
+        </p:txBody>
+      </p:sp>
+    </p:spTree>
+    <p:extLst>
+      <p:ext uri="{BB962C8B-B14F-4D97-AF65-F5344CB8AC3E}">
+        <p14:creationId xmlns:p14="http://schemas.microsoft.com/office/powerpoint/2010/main" val="2848909380"/>
+      </p:ext>
+    </p:extLst>
+  </p:cSld>
+  <p:clrMapOvr>
+    <a:masterClrMapping/>
+  </p:clrMapOvr>
+</p:sld>
+</file>
+
+<file path=ppt/slides/slide25.xml><?xml version="1.0" encoding="utf-8"?>
 <p:sld xmlns:a="http://schemas.openxmlformats.org/drawingml/2006/main" xmlns:r="http://schemas.openxmlformats.org/officeDocument/2006/relationships" xmlns:p="http://schemas.openxmlformats.org/presentationml/2006/main">
   <p:cSld>
     <p:bg>
@@ -5122,308 +7976,6 @@
     <p:extLst>
       <p:ext uri="{BB962C8B-B14F-4D97-AF65-F5344CB8AC3E}">
         <p14:creationId xmlns:p14="http://schemas.microsoft.com/office/powerpoint/2010/main" val="628979899"/>
-      </p:ext>
-    </p:extLst>
-  </p:cSld>
-  <p:clrMapOvr>
-    <a:masterClrMapping/>
-  </p:clrMapOvr>
-</p:sld>
-</file>
-
-<file path=ppt/slides/slide2.xml><?xml version="1.0" encoding="utf-8"?>
-<p:sld xmlns:a="http://schemas.openxmlformats.org/drawingml/2006/main" xmlns:r="http://schemas.openxmlformats.org/officeDocument/2006/relationships" xmlns:p="http://schemas.openxmlformats.org/presentationml/2006/main">
-  <p:cSld>
-    <p:bg>
-      <p:bgPr>
-        <a:solidFill>
-          <a:schemeClr val="bg1"/>
-        </a:solidFill>
-        <a:effectLst/>
-      </p:bgPr>
-    </p:bg>
-    <p:spTree>
-      <p:nvGrpSpPr>
-        <p:cNvPr id="1" name=""/>
-        <p:cNvGrpSpPr/>
-        <p:nvPr/>
-      </p:nvGrpSpPr>
-      <p:grpSpPr>
-        <a:xfrm>
-          <a:off x="0" y="0"/>
-          <a:ext cx="0" cy="0"/>
-          <a:chOff x="0" y="0"/>
-          <a:chExt cx="0" cy="0"/>
-        </a:xfrm>
-      </p:grpSpPr>
-      <p:sp>
-        <p:nvSpPr>
-          <p:cNvPr id="9" name="Rectangle 8">
-            <a:extLst>
-              <a:ext uri="{FF2B5EF4-FFF2-40B4-BE49-F238E27FC236}">
-                <a16:creationId xmlns:a16="http://schemas.microsoft.com/office/drawing/2014/main" id="{23962611-DFD5-4092-AAFD-559E3DFCE2C9}"/>
-              </a:ext>
-              <a:ext uri="{C183D7F6-B498-43B3-948B-1728B52AA6E4}">
-                <adec:decorative xmlns:adec="http://schemas.microsoft.com/office/drawing/2017/decorative" val="1"/>
-              </a:ext>
-            </a:extLst>
-          </p:cNvPr>
-          <p:cNvSpPr>
-            <a:spLocks noGrp="1" noRot="1" noChangeAspect="1" noMove="1" noResize="1" noEditPoints="1" noAdjustHandles="1" noChangeArrowheads="1" noChangeShapeType="1" noTextEdit="1"/>
-          </p:cNvSpPr>
-          <p:nvPr>
-            <p:extLst>
-              <p:ext uri="{386F3935-93C4-4BCD-93E2-E3B085C9AB24}">
-                <p16:designElem xmlns:p16="http://schemas.microsoft.com/office/powerpoint/2015/main" val="1"/>
-              </p:ext>
-            </p:extLst>
-          </p:nvPr>
-        </p:nvSpPr>
-        <p:spPr>
-          <a:xfrm>
-            <a:off x="475488" y="0"/>
-            <a:ext cx="10910292" cy="6858000"/>
-          </a:xfrm>
-          <a:prstGeom prst="rect">
-            <a:avLst/>
-          </a:prstGeom>
-          <a:gradFill>
-            <a:gsLst>
-              <a:gs pos="0">
-                <a:schemeClr val="accent1">
-                  <a:lumMod val="90000"/>
-                </a:schemeClr>
-              </a:gs>
-              <a:gs pos="25000">
-                <a:schemeClr val="accent1">
-                  <a:lumMod val="90000"/>
-                </a:schemeClr>
-              </a:gs>
-              <a:gs pos="94000">
-                <a:schemeClr val="bg2">
-                  <a:lumMod val="25000"/>
-                </a:schemeClr>
-              </a:gs>
-              <a:gs pos="100000">
-                <a:schemeClr val="bg2">
-                  <a:lumMod val="25000"/>
-                </a:schemeClr>
-              </a:gs>
-            </a:gsLst>
-            <a:lin ang="4200000" scaled="0"/>
-          </a:gradFill>
-          <a:ln>
-            <a:noFill/>
-          </a:ln>
-        </p:spPr>
-        <p:style>
-          <a:lnRef idx="2">
-            <a:schemeClr val="accent1">
-              <a:shade val="50000"/>
-            </a:schemeClr>
-          </a:lnRef>
-          <a:fillRef idx="1">
-            <a:schemeClr val="accent1"/>
-          </a:fillRef>
-          <a:effectRef idx="0">
-            <a:schemeClr val="accent1"/>
-          </a:effectRef>
-          <a:fontRef idx="minor">
-            <a:schemeClr val="lt1"/>
-          </a:fontRef>
-        </p:style>
-        <p:txBody>
-          <a:bodyPr rtlCol="0" anchor="ctr"/>
-          <a:lstStyle/>
-          <a:p>
-            <a:pPr algn="ctr"/>
-            <a:endParaRPr lang="en-US"/>
-          </a:p>
-        </p:txBody>
-      </p:sp>
-      <p:sp>
-        <p:nvSpPr>
-          <p:cNvPr id="2" name="Title 1"/>
-          <p:cNvSpPr>
-            <a:spLocks noGrp="1"/>
-          </p:cNvSpPr>
-          <p:nvPr>
-            <p:ph type="title"/>
-          </p:nvPr>
-        </p:nvSpPr>
-        <p:spPr>
-          <a:xfrm>
-            <a:off x="3045368" y="2043663"/>
-            <a:ext cx="6105194" cy="2031055"/>
-          </a:xfrm>
-        </p:spPr>
-        <p:txBody>
-          <a:bodyPr vert="horz" lIns="91440" tIns="45720" rIns="91440" bIns="45720" rtlCol="0" anchor="b">
-            <a:normAutofit/>
-          </a:bodyPr>
-          <a:lstStyle/>
-          <a:p>
-            <a:pPr algn="ctr"/>
-            <a:r>
-              <a:rPr lang="en-US" sz="6000" kern="1200">
-                <a:solidFill>
-                  <a:srgbClr val="FFFFFF"/>
-                </a:solidFill>
-                <a:latin typeface="+mj-lt"/>
-                <a:ea typeface="+mj-ea"/>
-                <a:cs typeface="+mj-cs"/>
-              </a:rPr>
-              <a:t>Contents</a:t>
-            </a:r>
-          </a:p>
-        </p:txBody>
-      </p:sp>
-      <p:sp>
-        <p:nvSpPr>
-          <p:cNvPr id="3" name="Content Placeholder 2"/>
-          <p:cNvSpPr>
-            <a:spLocks noGrp="1"/>
-          </p:cNvSpPr>
-          <p:nvPr>
-            <p:ph type="body" idx="1"/>
-          </p:nvPr>
-        </p:nvSpPr>
-        <p:spPr>
-          <a:xfrm>
-            <a:off x="3045368" y="4074717"/>
-            <a:ext cx="6105194" cy="1672940"/>
-          </a:xfrm>
-        </p:spPr>
-        <p:txBody>
-          <a:bodyPr vert="horz" lIns="91440" tIns="45720" rIns="91440" bIns="45720" rtlCol="0">
-            <a:normAutofit fontScale="77500" lnSpcReduction="20000"/>
-          </a:bodyPr>
-          <a:lstStyle/>
-          <a:p>
-            <a:pPr marL="0" indent="0" algn="ctr">
-              <a:buNone/>
-            </a:pPr>
-            <a:r>
-              <a:rPr lang="en-US" sz="2400" kern="1200" dirty="0">
-                <a:solidFill>
-                  <a:srgbClr val="FFFFFF"/>
-                </a:solidFill>
-                <a:latin typeface="+mn-lt"/>
-                <a:ea typeface="+mn-ea"/>
-                <a:cs typeface="+mn-cs"/>
-              </a:rPr>
-              <a:t>Equality</a:t>
-            </a:r>
-          </a:p>
-          <a:p>
-            <a:pPr marL="0" indent="0" algn="ctr">
-              <a:buNone/>
-            </a:pPr>
-            <a:r>
-              <a:rPr lang="en-US" sz="2400" dirty="0">
-                <a:solidFill>
-                  <a:srgbClr val="FFFFFF"/>
-                </a:solidFill>
-              </a:rPr>
-              <a:t>Type judgments</a:t>
-            </a:r>
-          </a:p>
-          <a:p>
-            <a:pPr marL="0" indent="0" algn="ctr">
-              <a:buNone/>
-            </a:pPr>
-            <a:r>
-              <a:rPr lang="en-US" sz="2400" kern="1200" dirty="0">
-                <a:solidFill>
-                  <a:srgbClr val="FFFFFF"/>
-                </a:solidFill>
-                <a:latin typeface="+mn-lt"/>
-                <a:ea typeface="+mn-ea"/>
-                <a:cs typeface="+mn-cs"/>
-              </a:rPr>
-              <a:t>Type inference</a:t>
-            </a:r>
-          </a:p>
-          <a:p>
-            <a:pPr marL="0" indent="0" algn="ctr">
-              <a:buNone/>
-            </a:pPr>
-            <a:r>
-              <a:rPr lang="en-US" sz="2400" dirty="0">
-                <a:solidFill>
-                  <a:srgbClr val="FFFFFF"/>
-                </a:solidFill>
-              </a:rPr>
-              <a:t>Propositions as types</a:t>
-            </a:r>
-          </a:p>
-          <a:p>
-            <a:pPr marL="0" indent="0" algn="ctr">
-              <a:buNone/>
-            </a:pPr>
-            <a:r>
-              <a:rPr lang="en-US" sz="2400" kern="1200" dirty="0">
-                <a:solidFill>
-                  <a:srgbClr val="FFFFFF"/>
-                </a:solidFill>
-                <a:latin typeface="+mn-lt"/>
-                <a:ea typeface="+mn-ea"/>
-                <a:cs typeface="+mn-cs"/>
-              </a:rPr>
-              <a:t>Automation</a:t>
-            </a:r>
-          </a:p>
-        </p:txBody>
-      </p:sp>
-      <p:pic>
-        <p:nvPicPr>
-          <p:cNvPr id="11" name="Picture 10">
-            <a:extLst>
-              <a:ext uri="{FF2B5EF4-FFF2-40B4-BE49-F238E27FC236}">
-                <a16:creationId xmlns:a16="http://schemas.microsoft.com/office/drawing/2014/main" id="{2270F1FA-0425-408F-9861-80BF5AFB276D}"/>
-              </a:ext>
-              <a:ext uri="{C183D7F6-B498-43B3-948B-1728B52AA6E4}">
-                <adec:decorative xmlns:adec="http://schemas.microsoft.com/office/drawing/2017/decorative" val="1"/>
-              </a:ext>
-            </a:extLst>
-          </p:cNvPr>
-          <p:cNvPicPr>
-            <a:picLocks noGrp="1" noRot="1" noChangeAspect="1" noMove="1" noResize="1" noEditPoints="1" noAdjustHandles="1" noChangeArrowheads="1" noChangeShapeType="1" noCrop="1"/>
-          </p:cNvPicPr>
-          <p:nvPr>
-            <p:extLst>
-              <p:ext uri="{386F3935-93C4-4BCD-93E2-E3B085C9AB24}">
-                <p16:designElem xmlns:p16="http://schemas.microsoft.com/office/powerpoint/2015/main" val="1"/>
-              </p:ext>
-            </p:extLst>
-          </p:nvPr>
-        </p:nvPicPr>
-        <p:blipFill>
-          <a:blip r:embed="rId2">
-            <a:extLst>
-              <a:ext uri="{28A0092B-C50C-407E-A947-70E740481C1C}">
-                <a14:useLocalDpi xmlns:a14="http://schemas.microsoft.com/office/drawing/2010/main" val="0"/>
-              </a:ext>
-            </a:extLst>
-          </a:blip>
-          <a:stretch>
-            <a:fillRect/>
-          </a:stretch>
-        </p:blipFill>
-        <p:spPr>
-          <a:xfrm>
-            <a:off x="0" y="0"/>
-            <a:ext cx="12192000" cy="6858000"/>
-          </a:xfrm>
-          <a:prstGeom prst="rect">
-            <a:avLst/>
-          </a:prstGeom>
-        </p:spPr>
-      </p:pic>
-    </p:spTree>
-    <p:extLst>
-      <p:ext uri="{BB962C8B-B14F-4D97-AF65-F5344CB8AC3E}">
-        <p14:creationId xmlns:p14="http://schemas.microsoft.com/office/powerpoint/2010/main" val="699473533"/>
       </p:ext>
     </p:extLst>
   </p:cSld>
@@ -6571,7 +9123,7 @@
                   <a:srgbClr val="FFFFFF"/>
                 </a:solidFill>
               </a:rPr>
-              <a:t>Type Judgments</a:t>
+              <a:t>Type Judgments and Inference</a:t>
             </a:r>
           </a:p>
         </p:txBody>

</xml_diff>

<commit_message>
Updated slides and minor typo fixes
</commit_message>
<xml_diff>
--- a/01_Equality/Equality.pptx
+++ b/01_Equality/Equality.pptx
@@ -5,7 +5,7 @@
     <p:sldMasterId id="2147483648" r:id="rId1"/>
   </p:sldMasterIdLst>
   <p:notesMasterIdLst>
-    <p:notesMasterId r:id="rId27"/>
+    <p:notesMasterId r:id="rId29"/>
   </p:notesMasterIdLst>
   <p:sldIdLst>
     <p:sldId id="258" r:id="rId2"/>
@@ -32,7 +32,9 @@
     <p:sldId id="281" r:id="rId23"/>
     <p:sldId id="282" r:id="rId24"/>
     <p:sldId id="283" r:id="rId25"/>
-    <p:sldId id="261" r:id="rId26"/>
+    <p:sldId id="285" r:id="rId26"/>
+    <p:sldId id="286" r:id="rId27"/>
+    <p:sldId id="261" r:id="rId28"/>
   </p:sldIdLst>
   <p:sldSz cx="12192000" cy="6858000"/>
   <p:notesSz cx="6858000" cy="9144000"/>
@@ -815,6 +817,90 @@
     <p:extLst>
       <p:ext uri="{BB962C8B-B14F-4D97-AF65-F5344CB8AC3E}">
         <p14:creationId xmlns:p14="http://schemas.microsoft.com/office/powerpoint/2010/main" val="3834513216"/>
+      </p:ext>
+    </p:extLst>
+  </p:cSld>
+  <p:clrMapOvr>
+    <a:masterClrMapping/>
+  </p:clrMapOvr>
+</p:notes>
+</file>
+
+<file path=ppt/notesSlides/notesSlide5.xml><?xml version="1.0" encoding="utf-8"?>
+<p:notes xmlns:a="http://schemas.openxmlformats.org/drawingml/2006/main" xmlns:r="http://schemas.openxmlformats.org/officeDocument/2006/relationships" xmlns:p="http://schemas.openxmlformats.org/presentationml/2006/main">
+  <p:cSld>
+    <p:spTree>
+      <p:nvGrpSpPr>
+        <p:cNvPr id="1" name=""/>
+        <p:cNvGrpSpPr/>
+        <p:nvPr/>
+      </p:nvGrpSpPr>
+      <p:grpSpPr>
+        <a:xfrm>
+          <a:off x="0" y="0"/>
+          <a:ext cx="0" cy="0"/>
+          <a:chOff x="0" y="0"/>
+          <a:chExt cx="0" cy="0"/>
+        </a:xfrm>
+      </p:grpSpPr>
+      <p:sp>
+        <p:nvSpPr>
+          <p:cNvPr id="2" name="Slide Image Placeholder 1"/>
+          <p:cNvSpPr>
+            <a:spLocks noGrp="1" noRot="1" noChangeAspect="1"/>
+          </p:cNvSpPr>
+          <p:nvPr>
+            <p:ph type="sldImg"/>
+          </p:nvPr>
+        </p:nvSpPr>
+        <p:spPr/>
+      </p:sp>
+      <p:sp>
+        <p:nvSpPr>
+          <p:cNvPr id="3" name="Notes Placeholder 2"/>
+          <p:cNvSpPr>
+            <a:spLocks noGrp="1"/>
+          </p:cNvSpPr>
+          <p:nvPr>
+            <p:ph type="body" idx="1"/>
+          </p:nvPr>
+        </p:nvSpPr>
+        <p:spPr/>
+        <p:txBody>
+          <a:bodyPr/>
+          <a:lstStyle/>
+          <a:p>
+            <a:endParaRPr lang="en-US" dirty="0"/>
+          </a:p>
+        </p:txBody>
+      </p:sp>
+      <p:sp>
+        <p:nvSpPr>
+          <p:cNvPr id="4" name="Slide Number Placeholder 3"/>
+          <p:cNvSpPr>
+            <a:spLocks noGrp="1"/>
+          </p:cNvSpPr>
+          <p:nvPr>
+            <p:ph type="sldNum" sz="quarter" idx="10"/>
+          </p:nvPr>
+        </p:nvSpPr>
+        <p:spPr/>
+        <p:txBody>
+          <a:bodyPr/>
+          <a:lstStyle/>
+          <a:p>
+            <a:fld id="{E0746DE6-3336-457D-A091-FA20AC1C536E}" type="slidenum">
+              <a:rPr lang="en-US" smtClean="0"/>
+              <a:t>25</a:t>
+            </a:fld>
+            <a:endParaRPr lang="en-US"/>
+          </a:p>
+        </p:txBody>
+      </p:sp>
+    </p:spTree>
+    <p:extLst>
+      <p:ext uri="{BB962C8B-B14F-4D97-AF65-F5344CB8AC3E}">
+        <p14:creationId xmlns:p14="http://schemas.microsoft.com/office/powerpoint/2010/main" val="916248818"/>
       </p:ext>
     </p:extLst>
   </p:cSld>
@@ -6048,13 +6134,13 @@
         </p:nvSpPr>
         <p:spPr>
           <a:xfrm>
-            <a:off x="3045368" y="4074717"/>
-            <a:ext cx="6105194" cy="1672940"/>
+            <a:off x="3045368" y="4074716"/>
+            <a:ext cx="6105194" cy="1838403"/>
           </a:xfrm>
         </p:spPr>
         <p:txBody>
           <a:bodyPr vert="horz" lIns="91440" tIns="45720" rIns="91440" bIns="45720" rtlCol="0">
-            <a:normAutofit fontScale="92500" lnSpcReduction="10000"/>
+            <a:normAutofit fontScale="92500" lnSpcReduction="20000"/>
           </a:bodyPr>
           <a:lstStyle/>
           <a:p>
@@ -6114,6 +6200,27 @@
               </a:rPr>
               <a:t>Automation</a:t>
             </a:r>
+          </a:p>
+          <a:p>
+            <a:pPr marL="0" indent="0" algn="ctr">
+              <a:buNone/>
+            </a:pPr>
+            <a:r>
+              <a:rPr lang="en-US" sz="2400" dirty="0">
+                <a:solidFill>
+                  <a:srgbClr val="FFFFFF"/>
+                </a:solidFill>
+              </a:rPr>
+              <a:t>Equality Properties</a:t>
+            </a:r>
+            <a:endParaRPr lang="en-US" sz="2400" kern="1200" dirty="0">
+              <a:solidFill>
+                <a:srgbClr val="FFFFFF"/>
+              </a:solidFill>
+              <a:latin typeface="+mn-lt"/>
+              <a:ea typeface="+mn-ea"/>
+              <a:cs typeface="+mn-cs"/>
+            </a:endParaRPr>
           </a:p>
         </p:txBody>
       </p:sp>
@@ -7725,6 +7832,341 @@
 </file>
 
 <file path=ppt/slides/slide25.xml><?xml version="1.0" encoding="utf-8"?>
+<p:sld xmlns:a="http://schemas.openxmlformats.org/drawingml/2006/main" xmlns:r="http://schemas.openxmlformats.org/officeDocument/2006/relationships" xmlns:p="http://schemas.openxmlformats.org/presentationml/2006/main">
+  <p:cSld>
+    <p:bg>
+      <p:bgPr>
+        <a:solidFill>
+          <a:schemeClr val="bg1"/>
+        </a:solidFill>
+        <a:effectLst/>
+      </p:bgPr>
+    </p:bg>
+    <p:spTree>
+      <p:nvGrpSpPr>
+        <p:cNvPr id="1" name=""/>
+        <p:cNvGrpSpPr/>
+        <p:nvPr/>
+      </p:nvGrpSpPr>
+      <p:grpSpPr>
+        <a:xfrm>
+          <a:off x="0" y="0"/>
+          <a:ext cx="0" cy="0"/>
+          <a:chOff x="0" y="0"/>
+          <a:chExt cx="0" cy="0"/>
+        </a:xfrm>
+      </p:grpSpPr>
+      <p:sp>
+        <p:nvSpPr>
+          <p:cNvPr id="9" name="Rectangle 8">
+            <a:extLst>
+              <a:ext uri="{FF2B5EF4-FFF2-40B4-BE49-F238E27FC236}">
+                <a16:creationId xmlns:a16="http://schemas.microsoft.com/office/drawing/2014/main" id="{23962611-DFD5-4092-AAFD-559E3DFCE2C9}"/>
+              </a:ext>
+              <a:ext uri="{C183D7F6-B498-43B3-948B-1728B52AA6E4}">
+                <adec:decorative xmlns:adec="http://schemas.microsoft.com/office/drawing/2017/decorative" val="1"/>
+              </a:ext>
+            </a:extLst>
+          </p:cNvPr>
+          <p:cNvSpPr>
+            <a:spLocks noGrp="1" noRot="1" noChangeAspect="1" noMove="1" noResize="1" noEditPoints="1" noAdjustHandles="1" noChangeArrowheads="1" noChangeShapeType="1" noTextEdit="1"/>
+          </p:cNvSpPr>
+          <p:nvPr>
+            <p:extLst>
+              <p:ext uri="{386F3935-93C4-4BCD-93E2-E3B085C9AB24}">
+                <p16:designElem xmlns:p16="http://schemas.microsoft.com/office/powerpoint/2015/main" val="1"/>
+              </p:ext>
+            </p:extLst>
+          </p:nvPr>
+        </p:nvSpPr>
+        <p:spPr>
+          <a:xfrm>
+            <a:off x="475488" y="0"/>
+            <a:ext cx="10910292" cy="6858000"/>
+          </a:xfrm>
+          <a:prstGeom prst="rect">
+            <a:avLst/>
+          </a:prstGeom>
+          <a:gradFill>
+            <a:gsLst>
+              <a:gs pos="0">
+                <a:schemeClr val="accent1">
+                  <a:lumMod val="90000"/>
+                </a:schemeClr>
+              </a:gs>
+              <a:gs pos="25000">
+                <a:schemeClr val="accent1">
+                  <a:lumMod val="90000"/>
+                </a:schemeClr>
+              </a:gs>
+              <a:gs pos="94000">
+                <a:schemeClr val="bg2">
+                  <a:lumMod val="25000"/>
+                </a:schemeClr>
+              </a:gs>
+              <a:gs pos="100000">
+                <a:schemeClr val="bg2">
+                  <a:lumMod val="25000"/>
+                </a:schemeClr>
+              </a:gs>
+            </a:gsLst>
+            <a:lin ang="4200000" scaled="0"/>
+          </a:gradFill>
+          <a:ln>
+            <a:noFill/>
+          </a:ln>
+        </p:spPr>
+        <p:style>
+          <a:lnRef idx="2">
+            <a:schemeClr val="accent1">
+              <a:shade val="50000"/>
+            </a:schemeClr>
+          </a:lnRef>
+          <a:fillRef idx="1">
+            <a:schemeClr val="accent1"/>
+          </a:fillRef>
+          <a:effectRef idx="0">
+            <a:schemeClr val="accent1"/>
+          </a:effectRef>
+          <a:fontRef idx="minor">
+            <a:schemeClr val="lt1"/>
+          </a:fontRef>
+        </p:style>
+        <p:txBody>
+          <a:bodyPr rtlCol="0" anchor="ctr"/>
+          <a:lstStyle/>
+          <a:p>
+            <a:pPr algn="ctr"/>
+            <a:endParaRPr lang="en-US"/>
+          </a:p>
+        </p:txBody>
+      </p:sp>
+      <p:sp>
+        <p:nvSpPr>
+          <p:cNvPr id="2" name="Title 1"/>
+          <p:cNvSpPr>
+            <a:spLocks noGrp="1"/>
+          </p:cNvSpPr>
+          <p:nvPr>
+            <p:ph type="title"/>
+          </p:nvPr>
+        </p:nvSpPr>
+        <p:spPr>
+          <a:xfrm>
+            <a:off x="3045368" y="2043663"/>
+            <a:ext cx="6105194" cy="2031055"/>
+          </a:xfrm>
+        </p:spPr>
+        <p:txBody>
+          <a:bodyPr vert="horz" lIns="91440" tIns="45720" rIns="91440" bIns="45720" rtlCol="0" anchor="b">
+            <a:normAutofit/>
+          </a:bodyPr>
+          <a:lstStyle/>
+          <a:p>
+            <a:pPr algn="ctr"/>
+            <a:r>
+              <a:rPr lang="en-US" sz="6000" dirty="0">
+                <a:solidFill>
+                  <a:srgbClr val="FFFFFF"/>
+                </a:solidFill>
+              </a:rPr>
+              <a:t>Equality Properties</a:t>
+            </a:r>
+          </a:p>
+        </p:txBody>
+      </p:sp>
+      <p:pic>
+        <p:nvPicPr>
+          <p:cNvPr id="11" name="Picture 10">
+            <a:extLst>
+              <a:ext uri="{FF2B5EF4-FFF2-40B4-BE49-F238E27FC236}">
+                <a16:creationId xmlns:a16="http://schemas.microsoft.com/office/drawing/2014/main" id="{2270F1FA-0425-408F-9861-80BF5AFB276D}"/>
+              </a:ext>
+              <a:ext uri="{C183D7F6-B498-43B3-948B-1728B52AA6E4}">
+                <adec:decorative xmlns:adec="http://schemas.microsoft.com/office/drawing/2017/decorative" val="1"/>
+              </a:ext>
+            </a:extLst>
+          </p:cNvPr>
+          <p:cNvPicPr>
+            <a:picLocks noGrp="1" noRot="1" noChangeAspect="1" noMove="1" noResize="1" noEditPoints="1" noAdjustHandles="1" noChangeArrowheads="1" noChangeShapeType="1" noCrop="1"/>
+          </p:cNvPicPr>
+          <p:nvPr>
+            <p:extLst>
+              <p:ext uri="{386F3935-93C4-4BCD-93E2-E3B085C9AB24}">
+                <p16:designElem xmlns:p16="http://schemas.microsoft.com/office/powerpoint/2015/main" val="1"/>
+              </p:ext>
+            </p:extLst>
+          </p:nvPr>
+        </p:nvPicPr>
+        <p:blipFill>
+          <a:blip r:embed="rId3">
+            <a:extLst>
+              <a:ext uri="{28A0092B-C50C-407E-A947-70E740481C1C}">
+                <a14:useLocalDpi xmlns:a14="http://schemas.microsoft.com/office/drawing/2010/main" val="0"/>
+              </a:ext>
+            </a:extLst>
+          </a:blip>
+          <a:stretch>
+            <a:fillRect/>
+          </a:stretch>
+        </p:blipFill>
+        <p:spPr>
+          <a:xfrm>
+            <a:off x="0" y="0"/>
+            <a:ext cx="12192000" cy="6858000"/>
+          </a:xfrm>
+          <a:prstGeom prst="rect">
+            <a:avLst/>
+          </a:prstGeom>
+        </p:spPr>
+      </p:pic>
+    </p:spTree>
+    <p:extLst>
+      <p:ext uri="{BB962C8B-B14F-4D97-AF65-F5344CB8AC3E}">
+        <p14:creationId xmlns:p14="http://schemas.microsoft.com/office/powerpoint/2010/main" val="2604569669"/>
+      </p:ext>
+    </p:extLst>
+  </p:cSld>
+  <p:clrMapOvr>
+    <a:masterClrMapping/>
+  </p:clrMapOvr>
+</p:sld>
+</file>
+
+<file path=ppt/slides/slide26.xml><?xml version="1.0" encoding="utf-8"?>
+<p:sld xmlns:a="http://schemas.openxmlformats.org/drawingml/2006/main" xmlns:r="http://schemas.openxmlformats.org/officeDocument/2006/relationships" xmlns:p="http://schemas.openxmlformats.org/presentationml/2006/main">
+  <p:cSld>
+    <p:spTree>
+      <p:nvGrpSpPr>
+        <p:cNvPr id="1" name=""/>
+        <p:cNvGrpSpPr/>
+        <p:nvPr/>
+      </p:nvGrpSpPr>
+      <p:grpSpPr>
+        <a:xfrm>
+          <a:off x="0" y="0"/>
+          <a:ext cx="0" cy="0"/>
+          <a:chOff x="0" y="0"/>
+          <a:chExt cx="0" cy="0"/>
+        </a:xfrm>
+      </p:grpSpPr>
+      <p:sp>
+        <p:nvSpPr>
+          <p:cNvPr id="2" name="Title 1">
+            <a:extLst>
+              <a:ext uri="{FF2B5EF4-FFF2-40B4-BE49-F238E27FC236}">
+                <a16:creationId xmlns:a16="http://schemas.microsoft.com/office/drawing/2014/main" id="{31F934D4-E79F-6546-A0D5-3AE9FB9723FD}"/>
+              </a:ext>
+            </a:extLst>
+          </p:cNvPr>
+          <p:cNvSpPr>
+            <a:spLocks noGrp="1"/>
+          </p:cNvSpPr>
+          <p:nvPr>
+            <p:ph type="title"/>
+          </p:nvPr>
+        </p:nvSpPr>
+        <p:spPr/>
+        <p:txBody>
+          <a:bodyPr/>
+          <a:lstStyle/>
+          <a:p>
+            <a:r>
+              <a:rPr lang="en-US" dirty="0"/>
+              <a:t>Properties of Equality</a:t>
+            </a:r>
+          </a:p>
+        </p:txBody>
+      </p:sp>
+      <p:sp>
+        <p:nvSpPr>
+          <p:cNvPr id="3" name="Content Placeholder 2">
+            <a:extLst>
+              <a:ext uri="{FF2B5EF4-FFF2-40B4-BE49-F238E27FC236}">
+                <a16:creationId xmlns:a16="http://schemas.microsoft.com/office/drawing/2014/main" id="{6B90F585-970D-B044-A1E8-CD71393CEE96}"/>
+              </a:ext>
+            </a:extLst>
+          </p:cNvPr>
+          <p:cNvSpPr>
+            <a:spLocks noGrp="1"/>
+          </p:cNvSpPr>
+          <p:nvPr>
+            <p:ph idx="1"/>
+          </p:nvPr>
+        </p:nvSpPr>
+        <p:spPr/>
+        <p:txBody>
+          <a:bodyPr/>
+          <a:lstStyle/>
+          <a:p>
+            <a:r>
+              <a:rPr lang="en-US" dirty="0"/>
+              <a:t>Reflexivity</a:t>
+            </a:r>
+          </a:p>
+          <a:p>
+            <a:pPr lvl="1"/>
+            <a:r>
+              <a:rPr lang="en-US" dirty="0"/>
+              <a:t>a = a</a:t>
+            </a:r>
+          </a:p>
+          <a:p>
+            <a:r>
+              <a:rPr lang="en-US" dirty="0"/>
+              <a:t>Symmetry</a:t>
+            </a:r>
+          </a:p>
+          <a:p>
+            <a:pPr lvl="1"/>
+            <a:r>
+              <a:rPr lang="en-US" dirty="0"/>
+              <a:t>a = b ⇔ b = a</a:t>
+            </a:r>
+          </a:p>
+          <a:p>
+            <a:r>
+              <a:rPr lang="en-US" dirty="0"/>
+              <a:t>Transitivity</a:t>
+            </a:r>
+          </a:p>
+          <a:p>
+            <a:pPr lvl="1"/>
+            <a:r>
+              <a:rPr lang="en-US" dirty="0"/>
+              <a:t>a = b ∧ b = c ⇒ a = c</a:t>
+            </a:r>
+          </a:p>
+          <a:p>
+            <a:r>
+              <a:rPr lang="en-US" dirty="0"/>
+              <a:t>Homework!</a:t>
+            </a:r>
+          </a:p>
+          <a:p>
+            <a:pPr lvl="1"/>
+            <a:r>
+              <a:rPr lang="en-US"/>
+              <a:t>01_Equality/06_properties.lean</a:t>
+            </a:r>
+            <a:endParaRPr lang="en-US" dirty="0"/>
+          </a:p>
+        </p:txBody>
+      </p:sp>
+    </p:spTree>
+    <p:extLst>
+      <p:ext uri="{BB962C8B-B14F-4D97-AF65-F5344CB8AC3E}">
+        <p14:creationId xmlns:p14="http://schemas.microsoft.com/office/powerpoint/2010/main" val="3672724588"/>
+      </p:ext>
+    </p:extLst>
+  </p:cSld>
+  <p:clrMapOvr>
+    <a:masterClrMapping/>
+  </p:clrMapOvr>
+</p:sld>
+</file>
+
+<file path=ppt/slides/slide27.xml><?xml version="1.0" encoding="utf-8"?>
 <p:sld xmlns:a="http://schemas.openxmlformats.org/drawingml/2006/main" xmlns:r="http://schemas.openxmlformats.org/officeDocument/2006/relationships" xmlns:p="http://schemas.openxmlformats.org/presentationml/2006/main">
   <p:cSld>
     <p:bg>

</xml_diff>